<commit_message>
Push project to GitHub
</commit_message>
<xml_diff>
--- a/doc/Rozpoznawanie dźwięku za pomocą MLP.pptx
+++ b/doc/Rozpoznawanie dźwięku za pomocą MLP.pptx
@@ -106,6 +106,22 @@
       </a:defRPr>
     </a:lvl9pPr>
   </p:defaultTextStyle>
+  <p:extLst>
+    <p:ext uri="{EFAFB233-063F-42B5-8137-9DF3F51BA10A}">
+      <p15:sldGuideLst xmlns:p15="http://schemas.microsoft.com/office/powerpoint/2012/main">
+        <p15:guide id="1" orient="horz" pos="2160">
+          <p15:clr>
+            <a:srgbClr val="A4A3A4"/>
+          </p15:clr>
+        </p15:guide>
+        <p15:guide id="2" pos="2880">
+          <p15:clr>
+            <a:srgbClr val="A4A3A4"/>
+          </p15:clr>
+        </p15:guide>
+      </p15:sldGuideLst>
+    </p:ext>
+  </p:extLst>
 </p:presentation>
 </file>
 
@@ -139,7 +155,7 @@
           <p:cNvPr id="7" name="image6.png">
             <a:extLst>
               <a:ext uri="{FF2B5EF4-FFF2-40B4-BE49-F238E27FC236}">
-                <a16:creationId xmlns="" xmlns:a16="http://schemas.microsoft.com/office/drawing/2014/main" id="{5A406649-E792-47B4-A9BF-064BABBBF6A4}"/>
+                <a16:creationId xmlns:a16="http://schemas.microsoft.com/office/drawing/2014/main" id="{5A406649-E792-47B4-A9BF-064BABBBF6A4}"/>
               </a:ext>
             </a:extLst>
           </p:cNvPr>
@@ -149,9 +165,7 @@
           <p:nvPr/>
         </p:nvPicPr>
         <p:blipFill>
-          <a:blip r:embed="rId2" cstate="print">
-            <a:extLst/>
-          </a:blip>
+          <a:blip r:embed="rId2" cstate="print"/>
           <a:stretch>
             <a:fillRect/>
           </a:stretch>
@@ -174,7 +188,7 @@
           <p:cNvPr id="11" name="image4.png">
             <a:extLst>
               <a:ext uri="{FF2B5EF4-FFF2-40B4-BE49-F238E27FC236}">
-                <a16:creationId xmlns="" xmlns:a16="http://schemas.microsoft.com/office/drawing/2014/main" id="{6A74313D-41E1-4A01-8C8A-EAEBAD82B8CB}"/>
+                <a16:creationId xmlns:a16="http://schemas.microsoft.com/office/drawing/2014/main" id="{6A74313D-41E1-4A01-8C8A-EAEBAD82B8CB}"/>
               </a:ext>
             </a:extLst>
           </p:cNvPr>
@@ -184,9 +198,7 @@
           <p:nvPr/>
         </p:nvPicPr>
         <p:blipFill>
-          <a:blip r:embed="rId3" cstate="print">
-            <a:extLst/>
-          </a:blip>
+          <a:blip r:embed="rId3" cstate="print"/>
           <a:stretch>
             <a:fillRect/>
           </a:stretch>
@@ -209,7 +221,7 @@
           <p:cNvPr id="12" name="image5.png">
             <a:extLst>
               <a:ext uri="{FF2B5EF4-FFF2-40B4-BE49-F238E27FC236}">
-                <a16:creationId xmlns="" xmlns:a16="http://schemas.microsoft.com/office/drawing/2014/main" id="{DBDB269D-8575-4836-BCDF-28DD1A792646}"/>
+                <a16:creationId xmlns:a16="http://schemas.microsoft.com/office/drawing/2014/main" id="{DBDB269D-8575-4836-BCDF-28DD1A792646}"/>
               </a:ext>
             </a:extLst>
           </p:cNvPr>
@@ -219,9 +231,7 @@
           <p:nvPr/>
         </p:nvPicPr>
         <p:blipFill>
-          <a:blip r:embed="rId4" cstate="print">
-            <a:extLst/>
-          </a:blip>
+          <a:blip r:embed="rId4" cstate="print"/>
           <a:stretch>
             <a:fillRect/>
           </a:stretch>
@@ -271,7 +281,7 @@
           </a:lstStyle>
           <a:p>
             <a:r>
-              <a:rPr lang="ru-RU" smtClean="0"/>
+              <a:rPr lang="ru-RU"/>
               <a:t>Образец заголовка</a:t>
             </a:r>
             <a:endParaRPr lang="en-US" dirty="0"/>
@@ -343,7 +353,7 @@
           </a:lstStyle>
           <a:p>
             <a:r>
-              <a:rPr lang="ru-RU" smtClean="0"/>
+              <a:rPr lang="ru-RU"/>
               <a:t>Образец подзаголовка</a:t>
             </a:r>
             <a:endParaRPr lang="en-US" dirty="0"/>
@@ -353,20 +363,13 @@
     </p:spTree>
     <p:extLst>
       <p:ext uri="{BB962C8B-B14F-4D97-AF65-F5344CB8AC3E}">
-        <p14:creationId xmlns="" xmlns:p14="http://schemas.microsoft.com/office/powerpoint/2010/main" val="1508859745"/>
+        <p14:creationId xmlns:p14="http://schemas.microsoft.com/office/powerpoint/2010/main" val="1508859745"/>
       </p:ext>
     </p:extLst>
   </p:cSld>
   <p:clrMapOvr>
     <a:masterClrMapping/>
   </p:clrMapOvr>
-  <p:timing>
-    <p:tnLst>
-      <p:par>
-        <p:cTn id="1" dur="indefinite" restart="never" nodeType="tmRoot"/>
-      </p:par>
-    </p:tnLst>
-  </p:timing>
 </p:sldLayout>
 </file>
 
@@ -404,7 +407,6 @@
           <a:p>
             <a:fld id="{E0A2B525-4DC4-4D80-9B28-8E8A85A06424}" type="datetimeFigureOut">
               <a:rPr lang="ru-RU" smtClean="0"/>
-              <a:pPr/>
               <a:t>27.01.2020</a:t>
             </a:fld>
             <a:endParaRPr lang="ru-RU"/>
@@ -447,7 +449,6 @@
           <a:p>
             <a:fld id="{E01011B8-8901-494C-ACF4-EF2A2E89E10E}" type="slidenum">
               <a:rPr lang="ru-RU" smtClean="0"/>
-              <a:pPr/>
               <a:t>‹#›</a:t>
             </a:fld>
             <a:endParaRPr lang="ru-RU"/>
@@ -481,20 +482,13 @@
     </p:spTree>
     <p:extLst>
       <p:ext uri="{BB962C8B-B14F-4D97-AF65-F5344CB8AC3E}">
-        <p14:creationId xmlns="" xmlns:p14="http://schemas.microsoft.com/office/powerpoint/2010/main" val="753366283"/>
+        <p14:creationId xmlns:p14="http://schemas.microsoft.com/office/powerpoint/2010/main" val="753366283"/>
       </p:ext>
     </p:extLst>
   </p:cSld>
   <p:clrMapOvr>
     <a:masterClrMapping/>
   </p:clrMapOvr>
-  <p:timing>
-    <p:tnLst>
-      <p:par>
-        <p:cTn id="1" dur="indefinite" restart="never" nodeType="tmRoot"/>
-      </p:par>
-    </p:tnLst>
-  </p:timing>
 </p:sldLayout>
 </file>
 
@@ -540,7 +534,7 @@
           </a:lstStyle>
           <a:p>
             <a:r>
-              <a:rPr lang="ru-RU" smtClean="0"/>
+              <a:rPr lang="ru-RU"/>
               <a:t>Образец заголовка</a:t>
             </a:r>
             <a:endParaRPr lang="en-US" dirty="0"/>
@@ -597,35 +591,35 @@
           <a:p>
             <a:pPr lvl="0"/>
             <a:r>
-              <a:rPr lang="ru-RU" smtClean="0"/>
+              <a:rPr lang="ru-RU"/>
               <a:t>Образец текста</a:t>
             </a:r>
           </a:p>
           <a:p>
             <a:pPr lvl="1"/>
             <a:r>
-              <a:rPr lang="ru-RU" smtClean="0"/>
+              <a:rPr lang="ru-RU"/>
               <a:t>Второй уровень</a:t>
             </a:r>
           </a:p>
           <a:p>
             <a:pPr lvl="2"/>
             <a:r>
-              <a:rPr lang="ru-RU" smtClean="0"/>
+              <a:rPr lang="ru-RU"/>
               <a:t>Третий уровень</a:t>
             </a:r>
           </a:p>
           <a:p>
             <a:pPr lvl="3"/>
             <a:r>
-              <a:rPr lang="ru-RU" smtClean="0"/>
+              <a:rPr lang="ru-RU"/>
               <a:t>Четвертый уровень</a:t>
             </a:r>
           </a:p>
           <a:p>
             <a:pPr lvl="4"/>
             <a:r>
-              <a:rPr lang="ru-RU" smtClean="0"/>
+              <a:rPr lang="ru-RU"/>
               <a:t>Пятый уровень</a:t>
             </a:r>
             <a:endParaRPr lang="en-US" dirty="0"/>
@@ -691,7 +685,7 @@
           <a:p>
             <a:pPr lvl="0"/>
             <a:r>
-              <a:rPr lang="ru-RU" smtClean="0"/>
+              <a:rPr lang="ru-RU"/>
               <a:t>Образец текста</a:t>
             </a:r>
           </a:p>
@@ -714,7 +708,6 @@
           <a:p>
             <a:fld id="{E0A2B525-4DC4-4D80-9B28-8E8A85A06424}" type="datetimeFigureOut">
               <a:rPr lang="ru-RU" smtClean="0"/>
-              <a:pPr/>
               <a:t>27.01.2020</a:t>
             </a:fld>
             <a:endParaRPr lang="ru-RU"/>
@@ -757,7 +750,6 @@
           <a:p>
             <a:fld id="{E01011B8-8901-494C-ACF4-EF2A2E89E10E}" type="slidenum">
               <a:rPr lang="ru-RU" smtClean="0"/>
-              <a:pPr/>
               <a:t>‹#›</a:t>
             </a:fld>
             <a:endParaRPr lang="ru-RU"/>
@@ -791,20 +783,13 @@
     </p:spTree>
     <p:extLst>
       <p:ext uri="{BB962C8B-B14F-4D97-AF65-F5344CB8AC3E}">
-        <p14:creationId xmlns="" xmlns:p14="http://schemas.microsoft.com/office/powerpoint/2010/main" val="1688890367"/>
+        <p14:creationId xmlns:p14="http://schemas.microsoft.com/office/powerpoint/2010/main" val="1688890367"/>
       </p:ext>
     </p:extLst>
   </p:cSld>
   <p:clrMapOvr>
     <a:masterClrMapping/>
   </p:clrMapOvr>
-  <p:timing>
-    <p:tnLst>
-      <p:par>
-        <p:cTn id="1" dur="indefinite" restart="never" nodeType="tmRoot"/>
-      </p:par>
-    </p:tnLst>
-  </p:timing>
 </p:sldLayout>
 </file>
 
@@ -850,7 +835,7 @@
           </a:lstStyle>
           <a:p>
             <a:r>
-              <a:rPr lang="ru-RU" smtClean="0"/>
+              <a:rPr lang="ru-RU"/>
               <a:t>Образец заголовка</a:t>
             </a:r>
             <a:endParaRPr lang="en-US" dirty="0"/>
@@ -915,7 +900,7 @@
           </a:lstStyle>
           <a:p>
             <a:r>
-              <a:rPr lang="ru-RU" smtClean="0"/>
+              <a:rPr lang="ru-RU"/>
               <a:t>Вставка рисунка</a:t>
             </a:r>
             <a:endParaRPr lang="en-US" dirty="0"/>
@@ -981,7 +966,7 @@
           <a:p>
             <a:pPr lvl="0"/>
             <a:r>
-              <a:rPr lang="ru-RU" smtClean="0"/>
+              <a:rPr lang="ru-RU"/>
               <a:t>Образец текста</a:t>
             </a:r>
           </a:p>
@@ -1004,7 +989,6 @@
           <a:p>
             <a:fld id="{E0A2B525-4DC4-4D80-9B28-8E8A85A06424}" type="datetimeFigureOut">
               <a:rPr lang="ru-RU" smtClean="0"/>
-              <a:pPr/>
               <a:t>27.01.2020</a:t>
             </a:fld>
             <a:endParaRPr lang="ru-RU"/>
@@ -1047,7 +1031,6 @@
           <a:p>
             <a:fld id="{E01011B8-8901-494C-ACF4-EF2A2E89E10E}" type="slidenum">
               <a:rPr lang="ru-RU" smtClean="0"/>
-              <a:pPr/>
               <a:t>‹#›</a:t>
             </a:fld>
             <a:endParaRPr lang="ru-RU"/>
@@ -1081,20 +1064,13 @@
     </p:spTree>
     <p:extLst>
       <p:ext uri="{BB962C8B-B14F-4D97-AF65-F5344CB8AC3E}">
-        <p14:creationId xmlns="" xmlns:p14="http://schemas.microsoft.com/office/powerpoint/2010/main" val="186999930"/>
+        <p14:creationId xmlns:p14="http://schemas.microsoft.com/office/powerpoint/2010/main" val="186999930"/>
       </p:ext>
     </p:extLst>
   </p:cSld>
   <p:clrMapOvr>
     <a:masterClrMapping/>
   </p:clrMapOvr>
-  <p:timing>
-    <p:tnLst>
-      <p:par>
-        <p:cTn id="1" dur="indefinite" restart="never" nodeType="tmRoot"/>
-      </p:par>
-    </p:tnLst>
-  </p:timing>
 </p:sldLayout>
 </file>
 
@@ -1131,7 +1107,7 @@
           <a:lstStyle/>
           <a:p>
             <a:r>
-              <a:rPr lang="ru-RU" smtClean="0"/>
+              <a:rPr lang="ru-RU"/>
               <a:t>Образец заголовка</a:t>
             </a:r>
             <a:endParaRPr lang="en-US" dirty="0"/>
@@ -1155,35 +1131,35 @@
           <a:p>
             <a:pPr lvl="0"/>
             <a:r>
-              <a:rPr lang="ru-RU" smtClean="0"/>
+              <a:rPr lang="ru-RU"/>
               <a:t>Образец текста</a:t>
             </a:r>
           </a:p>
           <a:p>
             <a:pPr lvl="1"/>
             <a:r>
-              <a:rPr lang="ru-RU" smtClean="0"/>
+              <a:rPr lang="ru-RU"/>
               <a:t>Второй уровень</a:t>
             </a:r>
           </a:p>
           <a:p>
             <a:pPr lvl="2"/>
             <a:r>
-              <a:rPr lang="ru-RU" smtClean="0"/>
+              <a:rPr lang="ru-RU"/>
               <a:t>Третий уровень</a:t>
             </a:r>
           </a:p>
           <a:p>
             <a:pPr lvl="3"/>
             <a:r>
-              <a:rPr lang="ru-RU" smtClean="0"/>
+              <a:rPr lang="ru-RU"/>
               <a:t>Четвертый уровень</a:t>
             </a:r>
           </a:p>
           <a:p>
             <a:pPr lvl="4"/>
             <a:r>
-              <a:rPr lang="ru-RU" smtClean="0"/>
+              <a:rPr lang="ru-RU"/>
               <a:t>Пятый уровень</a:t>
             </a:r>
             <a:endParaRPr lang="en-US" dirty="0"/>
@@ -1212,7 +1188,6 @@
           <a:p>
             <a:fld id="{E0A2B525-4DC4-4D80-9B28-8E8A85A06424}" type="datetimeFigureOut">
               <a:rPr lang="ru-RU" smtClean="0"/>
-              <a:pPr/>
               <a:t>27.01.2020</a:t>
             </a:fld>
             <a:endParaRPr lang="ru-RU"/>
@@ -1269,7 +1244,6 @@
           <a:p>
             <a:fld id="{E01011B8-8901-494C-ACF4-EF2A2E89E10E}" type="slidenum">
               <a:rPr lang="ru-RU" smtClean="0"/>
-              <a:pPr/>
               <a:t>‹#›</a:t>
             </a:fld>
             <a:endParaRPr lang="ru-RU"/>
@@ -1303,20 +1277,13 @@
     </p:spTree>
     <p:extLst>
       <p:ext uri="{BB962C8B-B14F-4D97-AF65-F5344CB8AC3E}">
-        <p14:creationId xmlns="" xmlns:p14="http://schemas.microsoft.com/office/powerpoint/2010/main" val="1646513699"/>
+        <p14:creationId xmlns:p14="http://schemas.microsoft.com/office/powerpoint/2010/main" val="1646513699"/>
       </p:ext>
     </p:extLst>
   </p:cSld>
   <p:clrMapOvr>
     <a:masterClrMapping/>
   </p:clrMapOvr>
-  <p:timing>
-    <p:tnLst>
-      <p:par>
-        <p:cTn id="1" dur="indefinite" restart="never" nodeType="tmRoot"/>
-      </p:par>
-    </p:tnLst>
-  </p:timing>
 </p:sldLayout>
 </file>
 
@@ -1358,7 +1325,7 @@
           <a:lstStyle/>
           <a:p>
             <a:r>
-              <a:rPr lang="ru-RU" smtClean="0"/>
+              <a:rPr lang="ru-RU"/>
               <a:t>Образец заголовка</a:t>
             </a:r>
             <a:endParaRPr lang="en-US" dirty="0"/>
@@ -1387,35 +1354,35 @@
           <a:p>
             <a:pPr lvl="0"/>
             <a:r>
-              <a:rPr lang="ru-RU" smtClean="0"/>
+              <a:rPr lang="ru-RU"/>
               <a:t>Образец текста</a:t>
             </a:r>
           </a:p>
           <a:p>
             <a:pPr lvl="1"/>
             <a:r>
-              <a:rPr lang="ru-RU" smtClean="0"/>
+              <a:rPr lang="ru-RU"/>
               <a:t>Второй уровень</a:t>
             </a:r>
           </a:p>
           <a:p>
             <a:pPr lvl="2"/>
             <a:r>
-              <a:rPr lang="ru-RU" smtClean="0"/>
+              <a:rPr lang="ru-RU"/>
               <a:t>Третий уровень</a:t>
             </a:r>
           </a:p>
           <a:p>
             <a:pPr lvl="3"/>
             <a:r>
-              <a:rPr lang="ru-RU" smtClean="0"/>
+              <a:rPr lang="ru-RU"/>
               <a:t>Четвертый уровень</a:t>
             </a:r>
           </a:p>
           <a:p>
             <a:pPr lvl="4"/>
             <a:r>
-              <a:rPr lang="ru-RU" smtClean="0"/>
+              <a:rPr lang="ru-RU"/>
               <a:t>Пятый уровень</a:t>
             </a:r>
             <a:endParaRPr lang="en-US" dirty="0"/>
@@ -1444,7 +1411,6 @@
           <a:p>
             <a:fld id="{E0A2B525-4DC4-4D80-9B28-8E8A85A06424}" type="datetimeFigureOut">
               <a:rPr lang="ru-RU" smtClean="0"/>
-              <a:pPr/>
               <a:t>27.01.2020</a:t>
             </a:fld>
             <a:endParaRPr lang="ru-RU"/>
@@ -1497,7 +1463,6 @@
           <a:p>
             <a:fld id="{E01011B8-8901-494C-ACF4-EF2A2E89E10E}" type="slidenum">
               <a:rPr lang="ru-RU" smtClean="0"/>
-              <a:pPr/>
               <a:t>‹#›</a:t>
             </a:fld>
             <a:endParaRPr lang="ru-RU"/>
@@ -1531,20 +1496,13 @@
     </p:spTree>
     <p:extLst>
       <p:ext uri="{BB962C8B-B14F-4D97-AF65-F5344CB8AC3E}">
-        <p14:creationId xmlns="" xmlns:p14="http://schemas.microsoft.com/office/powerpoint/2010/main" val="128710346"/>
+        <p14:creationId xmlns:p14="http://schemas.microsoft.com/office/powerpoint/2010/main" val="128710346"/>
       </p:ext>
     </p:extLst>
   </p:cSld>
   <p:clrMapOvr>
     <a:masterClrMapping/>
   </p:clrMapOvr>
-  <p:timing>
-    <p:tnLst>
-      <p:par>
-        <p:cTn id="1" dur="indefinite" restart="never" nodeType="tmRoot"/>
-      </p:par>
-    </p:tnLst>
-  </p:timing>
 </p:sldLayout>
 </file>
 
@@ -1574,9 +1532,7 @@
           <p:nvPr/>
         </p:nvPicPr>
         <p:blipFill rotWithShape="1">
-          <a:blip r:embed="rId2" cstate="print">
-            <a:extLst/>
-          </a:blip>
+          <a:blip r:embed="rId2" cstate="print"/>
           <a:srcRect l="14557" t="-172" r="14806" b="172"/>
           <a:stretch/>
         </p:blipFill>
@@ -1652,7 +1608,6 @@
           <a:p>
             <a:fld id="{E0A2B525-4DC4-4D80-9B28-8E8A85A06424}" type="datetimeFigureOut">
               <a:rPr lang="ru-RU" smtClean="0"/>
-              <a:pPr/>
               <a:t>27.01.2020</a:t>
             </a:fld>
             <a:endParaRPr lang="ru-RU"/>
@@ -1715,7 +1670,7 @@
               </a:spcBef>
             </a:pPr>
             <a:r>
-              <a:rPr lang="ru-RU" smtClean="0"/>
+              <a:rPr lang="ru-RU"/>
               <a:t>Образец текста</a:t>
             </a:r>
           </a:p>
@@ -1726,7 +1681,7 @@
               </a:spcBef>
             </a:pPr>
             <a:r>
-              <a:rPr lang="ru-RU" smtClean="0"/>
+              <a:rPr lang="ru-RU"/>
               <a:t>Второй уровень</a:t>
             </a:r>
           </a:p>
@@ -1737,7 +1692,7 @@
               </a:spcBef>
             </a:pPr>
             <a:r>
-              <a:rPr lang="ru-RU" smtClean="0"/>
+              <a:rPr lang="ru-RU"/>
               <a:t>Третий уровень</a:t>
             </a:r>
           </a:p>
@@ -1748,7 +1703,7 @@
               </a:spcBef>
             </a:pPr>
             <a:r>
-              <a:rPr lang="ru-RU" smtClean="0"/>
+              <a:rPr lang="ru-RU"/>
               <a:t>Четвертый уровень</a:t>
             </a:r>
           </a:p>
@@ -1781,20 +1736,13 @@
     </p:spTree>
     <p:extLst>
       <p:ext uri="{BB962C8B-B14F-4D97-AF65-F5344CB8AC3E}">
-        <p14:creationId xmlns="" xmlns:p14="http://schemas.microsoft.com/office/powerpoint/2010/main" val="4042724759"/>
+        <p14:creationId xmlns:p14="http://schemas.microsoft.com/office/powerpoint/2010/main" val="4042724759"/>
       </p:ext>
     </p:extLst>
   </p:cSld>
   <p:clrMapOvr>
     <a:masterClrMapping/>
   </p:clrMapOvr>
-  <p:timing>
-    <p:tnLst>
-      <p:par>
-        <p:cTn id="1" dur="indefinite" restart="never" nodeType="tmRoot"/>
-      </p:par>
-    </p:tnLst>
-  </p:timing>
 </p:sldLayout>
 </file>
 
@@ -1827,7 +1775,7 @@
           <a:blip r:embed="rId2" cstate="print">
             <a:extLst>
               <a:ext uri="{28A0092B-C50C-407E-A947-70E740481C1C}">
-                <a14:useLocalDpi xmlns="" xmlns:a14="http://schemas.microsoft.com/office/drawing/2010/main" val="0"/>
+                <a14:useLocalDpi xmlns:a14="http://schemas.microsoft.com/office/drawing/2010/main" val="0"/>
               </a:ext>
             </a:extLst>
           </a:blip>
@@ -1907,7 +1855,6 @@
           <a:p>
             <a:fld id="{E0A2B525-4DC4-4D80-9B28-8E8A85A06424}" type="datetimeFigureOut">
               <a:rPr lang="ru-RU" smtClean="0"/>
-              <a:pPr/>
               <a:t>27.01.2020</a:t>
             </a:fld>
             <a:endParaRPr lang="ru-RU"/>
@@ -1970,7 +1917,7 @@
               </a:spcBef>
             </a:pPr>
             <a:r>
-              <a:rPr lang="ru-RU" smtClean="0"/>
+              <a:rPr lang="ru-RU"/>
               <a:t>Образец текста</a:t>
             </a:r>
           </a:p>
@@ -1981,7 +1928,7 @@
               </a:spcBef>
             </a:pPr>
             <a:r>
-              <a:rPr lang="ru-RU" smtClean="0"/>
+              <a:rPr lang="ru-RU"/>
               <a:t>Второй уровень</a:t>
             </a:r>
           </a:p>
@@ -1992,7 +1939,7 @@
               </a:spcBef>
             </a:pPr>
             <a:r>
-              <a:rPr lang="ru-RU" smtClean="0"/>
+              <a:rPr lang="ru-RU"/>
               <a:t>Третий уровень</a:t>
             </a:r>
           </a:p>
@@ -2003,7 +1950,7 @@
               </a:spcBef>
             </a:pPr>
             <a:r>
-              <a:rPr lang="ru-RU" smtClean="0"/>
+              <a:rPr lang="ru-RU"/>
               <a:t>Четвертый уровень</a:t>
             </a:r>
           </a:p>
@@ -2036,20 +1983,13 @@
     </p:spTree>
     <p:extLst>
       <p:ext uri="{BB962C8B-B14F-4D97-AF65-F5344CB8AC3E}">
-        <p14:creationId xmlns="" xmlns:p14="http://schemas.microsoft.com/office/powerpoint/2010/main" val="4091376097"/>
+        <p14:creationId xmlns:p14="http://schemas.microsoft.com/office/powerpoint/2010/main" val="4091376097"/>
       </p:ext>
     </p:extLst>
   </p:cSld>
   <p:clrMapOvr>
     <a:masterClrMapping/>
   </p:clrMapOvr>
-  <p:timing>
-    <p:tnLst>
-      <p:par>
-        <p:cTn id="1" dur="indefinite" restart="never" nodeType="tmRoot"/>
-      </p:par>
-    </p:tnLst>
-  </p:timing>
 </p:sldLayout>
 </file>
 
@@ -2082,7 +2022,7 @@
           <a:blip r:embed="rId2" cstate="print">
             <a:extLst>
               <a:ext uri="{28A0092B-C50C-407E-A947-70E740481C1C}">
-                <a14:useLocalDpi xmlns="" xmlns:a14="http://schemas.microsoft.com/office/drawing/2010/main" val="0"/>
+                <a14:useLocalDpi xmlns:a14="http://schemas.microsoft.com/office/drawing/2010/main" val="0"/>
               </a:ext>
             </a:extLst>
           </a:blip>
@@ -2162,7 +2102,6 @@
           <a:p>
             <a:fld id="{E0A2B525-4DC4-4D80-9B28-8E8A85A06424}" type="datetimeFigureOut">
               <a:rPr lang="ru-RU" smtClean="0"/>
-              <a:pPr/>
               <a:t>27.01.2020</a:t>
             </a:fld>
             <a:endParaRPr lang="ru-RU"/>
@@ -2225,7 +2164,7 @@
               </a:spcBef>
             </a:pPr>
             <a:r>
-              <a:rPr lang="ru-RU" smtClean="0"/>
+              <a:rPr lang="ru-RU"/>
               <a:t>Образец текста</a:t>
             </a:r>
           </a:p>
@@ -2236,7 +2175,7 @@
               </a:spcBef>
             </a:pPr>
             <a:r>
-              <a:rPr lang="ru-RU" smtClean="0"/>
+              <a:rPr lang="ru-RU"/>
               <a:t>Второй уровень</a:t>
             </a:r>
           </a:p>
@@ -2247,7 +2186,7 @@
               </a:spcBef>
             </a:pPr>
             <a:r>
-              <a:rPr lang="ru-RU" smtClean="0"/>
+              <a:rPr lang="ru-RU"/>
               <a:t>Третий уровень</a:t>
             </a:r>
           </a:p>
@@ -2258,7 +2197,7 @@
               </a:spcBef>
             </a:pPr>
             <a:r>
-              <a:rPr lang="ru-RU" smtClean="0"/>
+              <a:rPr lang="ru-RU"/>
               <a:t>Четвертый уровень</a:t>
             </a:r>
           </a:p>
@@ -2291,20 +2230,13 @@
     </p:spTree>
     <p:extLst>
       <p:ext uri="{BB962C8B-B14F-4D97-AF65-F5344CB8AC3E}">
-        <p14:creationId xmlns="" xmlns:p14="http://schemas.microsoft.com/office/powerpoint/2010/main" val="3337830424"/>
+        <p14:creationId xmlns:p14="http://schemas.microsoft.com/office/powerpoint/2010/main" val="3337830424"/>
       </p:ext>
     </p:extLst>
   </p:cSld>
   <p:clrMapOvr>
     <a:masterClrMapping/>
   </p:clrMapOvr>
-  <p:timing>
-    <p:tnLst>
-      <p:par>
-        <p:cTn id="1" dur="indefinite" restart="never" nodeType="tmRoot"/>
-      </p:par>
-    </p:tnLst>
-  </p:timing>
 </p:sldLayout>
 </file>
 
@@ -2337,7 +2269,7 @@
           <a:blip r:embed="rId2" cstate="print">
             <a:extLst>
               <a:ext uri="{28A0092B-C50C-407E-A947-70E740481C1C}">
-                <a14:useLocalDpi xmlns="" xmlns:a14="http://schemas.microsoft.com/office/drawing/2010/main" val="0"/>
+                <a14:useLocalDpi xmlns:a14="http://schemas.microsoft.com/office/drawing/2010/main" val="0"/>
               </a:ext>
             </a:extLst>
           </a:blip>
@@ -2417,7 +2349,6 @@
           <a:p>
             <a:fld id="{E0A2B525-4DC4-4D80-9B28-8E8A85A06424}" type="datetimeFigureOut">
               <a:rPr lang="ru-RU" smtClean="0"/>
-              <a:pPr/>
               <a:t>27.01.2020</a:t>
             </a:fld>
             <a:endParaRPr lang="ru-RU"/>
@@ -2480,7 +2411,7 @@
               </a:spcBef>
             </a:pPr>
             <a:r>
-              <a:rPr lang="ru-RU" smtClean="0"/>
+              <a:rPr lang="ru-RU"/>
               <a:t>Образец текста</a:t>
             </a:r>
           </a:p>
@@ -2491,7 +2422,7 @@
               </a:spcBef>
             </a:pPr>
             <a:r>
-              <a:rPr lang="ru-RU" smtClean="0"/>
+              <a:rPr lang="ru-RU"/>
               <a:t>Второй уровень</a:t>
             </a:r>
           </a:p>
@@ -2502,7 +2433,7 @@
               </a:spcBef>
             </a:pPr>
             <a:r>
-              <a:rPr lang="ru-RU" smtClean="0"/>
+              <a:rPr lang="ru-RU"/>
               <a:t>Третий уровень</a:t>
             </a:r>
           </a:p>
@@ -2513,7 +2444,7 @@
               </a:spcBef>
             </a:pPr>
             <a:r>
-              <a:rPr lang="ru-RU" smtClean="0"/>
+              <a:rPr lang="ru-RU"/>
               <a:t>Четвертый уровень</a:t>
             </a:r>
           </a:p>
@@ -2546,20 +2477,13 @@
     </p:spTree>
     <p:extLst>
       <p:ext uri="{BB962C8B-B14F-4D97-AF65-F5344CB8AC3E}">
-        <p14:creationId xmlns="" xmlns:p14="http://schemas.microsoft.com/office/powerpoint/2010/main" val="1267952272"/>
+        <p14:creationId xmlns:p14="http://schemas.microsoft.com/office/powerpoint/2010/main" val="1267952272"/>
       </p:ext>
     </p:extLst>
   </p:cSld>
   <p:clrMapOvr>
     <a:masterClrMapping/>
   </p:clrMapOvr>
-  <p:timing>
-    <p:tnLst>
-      <p:par>
-        <p:cTn id="1" dur="indefinite" restart="never" nodeType="tmRoot"/>
-      </p:par>
-    </p:tnLst>
-  </p:timing>
 </p:sldLayout>
 </file>
 
@@ -2592,7 +2516,7 @@
           <a:blip r:embed="rId2" cstate="print">
             <a:extLst>
               <a:ext uri="{28A0092B-C50C-407E-A947-70E740481C1C}">
-                <a14:useLocalDpi xmlns="" xmlns:a14="http://schemas.microsoft.com/office/drawing/2010/main" val="0"/>
+                <a14:useLocalDpi xmlns:a14="http://schemas.microsoft.com/office/drawing/2010/main" val="0"/>
               </a:ext>
             </a:extLst>
           </a:blip>
@@ -2672,7 +2596,6 @@
           <a:p>
             <a:fld id="{E0A2B525-4DC4-4D80-9B28-8E8A85A06424}" type="datetimeFigureOut">
               <a:rPr lang="ru-RU" smtClean="0"/>
-              <a:pPr/>
               <a:t>27.01.2020</a:t>
             </a:fld>
             <a:endParaRPr lang="ru-RU"/>
@@ -2735,7 +2658,7 @@
               </a:spcBef>
             </a:pPr>
             <a:r>
-              <a:rPr lang="ru-RU" smtClean="0"/>
+              <a:rPr lang="ru-RU"/>
               <a:t>Образец текста</a:t>
             </a:r>
           </a:p>
@@ -2746,7 +2669,7 @@
               </a:spcBef>
             </a:pPr>
             <a:r>
-              <a:rPr lang="ru-RU" smtClean="0"/>
+              <a:rPr lang="ru-RU"/>
               <a:t>Второй уровень</a:t>
             </a:r>
           </a:p>
@@ -2757,7 +2680,7 @@
               </a:spcBef>
             </a:pPr>
             <a:r>
-              <a:rPr lang="ru-RU" smtClean="0"/>
+              <a:rPr lang="ru-RU"/>
               <a:t>Третий уровень</a:t>
             </a:r>
           </a:p>
@@ -2768,7 +2691,7 @@
               </a:spcBef>
             </a:pPr>
             <a:r>
-              <a:rPr lang="ru-RU" smtClean="0"/>
+              <a:rPr lang="ru-RU"/>
               <a:t>Четвертый уровень</a:t>
             </a:r>
           </a:p>
@@ -2801,20 +2724,13 @@
     </p:spTree>
     <p:extLst>
       <p:ext uri="{BB962C8B-B14F-4D97-AF65-F5344CB8AC3E}">
-        <p14:creationId xmlns="" xmlns:p14="http://schemas.microsoft.com/office/powerpoint/2010/main" val="2222010789"/>
+        <p14:creationId xmlns:p14="http://schemas.microsoft.com/office/powerpoint/2010/main" val="2222010789"/>
       </p:ext>
     </p:extLst>
   </p:cSld>
   <p:clrMapOvr>
     <a:masterClrMapping/>
   </p:clrMapOvr>
-  <p:timing>
-    <p:tnLst>
-      <p:par>
-        <p:cTn id="1" dur="indefinite" restart="never" nodeType="tmRoot"/>
-      </p:par>
-    </p:tnLst>
-  </p:timing>
 </p:sldLayout>
 </file>
 
@@ -2875,7 +2791,7 @@
           <a:lstStyle/>
           <a:p>
             <a:r>
-              <a:rPr lang="ru-RU" smtClean="0"/>
+              <a:rPr lang="ru-RU"/>
               <a:t>Образец заголовка</a:t>
             </a:r>
             <a:endParaRPr lang="en-US" dirty="0"/>
@@ -2899,35 +2815,35 @@
           <a:p>
             <a:pPr lvl="0"/>
             <a:r>
-              <a:rPr lang="ru-RU" smtClean="0"/>
+              <a:rPr lang="ru-RU"/>
               <a:t>Образец текста</a:t>
             </a:r>
           </a:p>
           <a:p>
             <a:pPr lvl="1"/>
             <a:r>
-              <a:rPr lang="ru-RU" smtClean="0"/>
+              <a:rPr lang="ru-RU"/>
               <a:t>Второй уровень</a:t>
             </a:r>
           </a:p>
           <a:p>
             <a:pPr lvl="2"/>
             <a:r>
-              <a:rPr lang="ru-RU" smtClean="0"/>
+              <a:rPr lang="ru-RU"/>
               <a:t>Третий уровень</a:t>
             </a:r>
           </a:p>
           <a:p>
             <a:pPr lvl="3"/>
             <a:r>
-              <a:rPr lang="ru-RU" smtClean="0"/>
+              <a:rPr lang="ru-RU"/>
               <a:t>Четвертый уровень</a:t>
             </a:r>
           </a:p>
           <a:p>
             <a:pPr lvl="4"/>
             <a:r>
-              <a:rPr lang="ru-RU" smtClean="0"/>
+              <a:rPr lang="ru-RU"/>
               <a:t>Пятый уровень</a:t>
             </a:r>
             <a:endParaRPr lang="en-US" dirty="0"/>
@@ -2951,7 +2867,6 @@
           <a:p>
             <a:fld id="{E0A2B525-4DC4-4D80-9B28-8E8A85A06424}" type="datetimeFigureOut">
               <a:rPr lang="ru-RU" smtClean="0"/>
-              <a:pPr/>
               <a:t>27.01.2020</a:t>
             </a:fld>
             <a:endParaRPr lang="ru-RU"/>
@@ -3015,7 +2930,6 @@
           <a:p>
             <a:fld id="{E01011B8-8901-494C-ACF4-EF2A2E89E10E}" type="slidenum">
               <a:rPr lang="ru-RU" smtClean="0"/>
-              <a:pPr/>
               <a:t>‹#›</a:t>
             </a:fld>
             <a:endParaRPr lang="ru-RU"/>
@@ -3025,20 +2939,13 @@
     </p:spTree>
     <p:extLst>
       <p:ext uri="{BB962C8B-B14F-4D97-AF65-F5344CB8AC3E}">
-        <p14:creationId xmlns="" xmlns:p14="http://schemas.microsoft.com/office/powerpoint/2010/main" val="152915371"/>
+        <p14:creationId xmlns:p14="http://schemas.microsoft.com/office/powerpoint/2010/main" val="152915371"/>
       </p:ext>
     </p:extLst>
   </p:cSld>
   <p:clrMapOvr>
     <a:masterClrMapping/>
   </p:clrMapOvr>
-  <p:timing>
-    <p:tnLst>
-      <p:par>
-        <p:cTn id="1" dur="indefinite" restart="never" nodeType="tmRoot"/>
-      </p:par>
-    </p:tnLst>
-  </p:timing>
 </p:sldLayout>
 </file>
 
@@ -3147,7 +3054,7 @@
           </a:lstStyle>
           <a:p>
             <a:r>
-              <a:rPr lang="ru-RU" smtClean="0"/>
+              <a:rPr lang="ru-RU"/>
               <a:t>Образец заголовка</a:t>
             </a:r>
             <a:endParaRPr lang="en-US" dirty="0"/>
@@ -3219,7 +3126,7 @@
           </a:lstStyle>
           <a:p>
             <a:r>
-              <a:rPr lang="ru-RU" smtClean="0"/>
+              <a:rPr lang="ru-RU"/>
               <a:t>Образец подзаголовка</a:t>
             </a:r>
             <a:endParaRPr lang="en-US" dirty="0"/>
@@ -3253,20 +3160,13 @@
     </p:spTree>
     <p:extLst>
       <p:ext uri="{BB962C8B-B14F-4D97-AF65-F5344CB8AC3E}">
-        <p14:creationId xmlns="" xmlns:p14="http://schemas.microsoft.com/office/powerpoint/2010/main" val="2781355781"/>
+        <p14:creationId xmlns:p14="http://schemas.microsoft.com/office/powerpoint/2010/main" val="2781355781"/>
       </p:ext>
     </p:extLst>
   </p:cSld>
   <p:clrMapOvr>
     <a:masterClrMapping/>
   </p:clrMapOvr>
-  <p:timing>
-    <p:tnLst>
-      <p:par>
-        <p:cTn id="1" dur="indefinite" restart="never" nodeType="tmRoot"/>
-      </p:par>
-    </p:tnLst>
-  </p:timing>
 </p:sldLayout>
 </file>
 
@@ -3327,7 +3227,7 @@
           <a:lstStyle/>
           <a:p>
             <a:r>
-              <a:rPr lang="ru-RU" smtClean="0"/>
+              <a:rPr lang="ru-RU"/>
               <a:t>Образец заголовка</a:t>
             </a:r>
             <a:endParaRPr lang="en-US" dirty="0"/>
@@ -3351,35 +3251,35 @@
           <a:p>
             <a:pPr lvl="0"/>
             <a:r>
-              <a:rPr lang="ru-RU" smtClean="0"/>
+              <a:rPr lang="ru-RU"/>
               <a:t>Образец текста</a:t>
             </a:r>
           </a:p>
           <a:p>
             <a:pPr lvl="1"/>
             <a:r>
-              <a:rPr lang="ru-RU" smtClean="0"/>
+              <a:rPr lang="ru-RU"/>
               <a:t>Второй уровень</a:t>
             </a:r>
           </a:p>
           <a:p>
             <a:pPr lvl="2"/>
             <a:r>
-              <a:rPr lang="ru-RU" smtClean="0"/>
+              <a:rPr lang="ru-RU"/>
               <a:t>Третий уровень</a:t>
             </a:r>
           </a:p>
           <a:p>
             <a:pPr lvl="3"/>
             <a:r>
-              <a:rPr lang="ru-RU" smtClean="0"/>
+              <a:rPr lang="ru-RU"/>
               <a:t>Четвертый уровень</a:t>
             </a:r>
           </a:p>
           <a:p>
             <a:pPr lvl="4"/>
             <a:r>
-              <a:rPr lang="ru-RU" smtClean="0"/>
+              <a:rPr lang="ru-RU"/>
               <a:t>Пятый уровень</a:t>
             </a:r>
             <a:endParaRPr lang="en-US" dirty="0"/>
@@ -3404,7 +3304,7 @@
             <a:fld id="{FA74725E-9BBD-400D-9BC6-C17F4312B59B}" type="datetime1">
               <a:rPr lang="pl-PL" smtClean="0"/>
               <a:pPr/>
-              <a:t>2020-01-27</a:t>
+              <a:t>27.01.2020</a:t>
             </a:fld>
             <a:endParaRPr lang="pl-PL"/>
           </a:p>
@@ -3477,20 +3377,13 @@
     </p:spTree>
     <p:extLst>
       <p:ext uri="{BB962C8B-B14F-4D97-AF65-F5344CB8AC3E}">
-        <p14:creationId xmlns="" xmlns:p14="http://schemas.microsoft.com/office/powerpoint/2010/main" val="474565923"/>
+        <p14:creationId xmlns:p14="http://schemas.microsoft.com/office/powerpoint/2010/main" val="474565923"/>
       </p:ext>
     </p:extLst>
   </p:cSld>
   <p:clrMapOvr>
     <a:masterClrMapping/>
   </p:clrMapOvr>
-  <p:timing>
-    <p:tnLst>
-      <p:par>
-        <p:cTn id="1" dur="indefinite" restart="never" nodeType="tmRoot"/>
-      </p:par>
-    </p:tnLst>
-  </p:timing>
 </p:sldLayout>
 </file>
 
@@ -3599,7 +3492,7 @@
           </a:lstStyle>
           <a:p>
             <a:r>
-              <a:rPr lang="ru-RU" smtClean="0"/>
+              <a:rPr lang="ru-RU"/>
               <a:t>Образец заголовка</a:t>
             </a:r>
             <a:endParaRPr lang="en-US" dirty="0"/>
@@ -3671,7 +3564,7 @@
           </a:lstStyle>
           <a:p>
             <a:r>
-              <a:rPr lang="ru-RU" smtClean="0"/>
+              <a:rPr lang="ru-RU"/>
               <a:t>Образец подзаголовка</a:t>
             </a:r>
             <a:endParaRPr lang="en-US" dirty="0"/>
@@ -3705,20 +3598,13 @@
     </p:spTree>
     <p:extLst>
       <p:ext uri="{BB962C8B-B14F-4D97-AF65-F5344CB8AC3E}">
-        <p14:creationId xmlns="" xmlns:p14="http://schemas.microsoft.com/office/powerpoint/2010/main" val="340198608"/>
+        <p14:creationId xmlns:p14="http://schemas.microsoft.com/office/powerpoint/2010/main" val="340198608"/>
       </p:ext>
     </p:extLst>
   </p:cSld>
   <p:clrMapOvr>
     <a:overrideClrMapping bg1="lt1" tx1="dk1" bg2="lt2" tx2="dk2" accent1="accent1" accent2="accent2" accent3="accent3" accent4="accent4" accent5="accent5" accent6="accent6" hlink="hlink" folHlink="folHlink"/>
   </p:clrMapOvr>
-  <p:timing>
-    <p:tnLst>
-      <p:par>
-        <p:cTn id="1" dur="indefinite" restart="never" nodeType="tmRoot"/>
-      </p:par>
-    </p:tnLst>
-  </p:timing>
 </p:sldLayout>
 </file>
 
@@ -3766,7 +3652,7 @@
           </a:lstStyle>
           <a:p>
             <a:r>
-              <a:rPr lang="ru-RU" smtClean="0"/>
+              <a:rPr lang="ru-RU"/>
               <a:t>Образец заголовка</a:t>
             </a:r>
             <a:endParaRPr lang="en-US" dirty="0"/>
@@ -3888,7 +3774,7 @@
           <a:p>
             <a:pPr lvl="0"/>
             <a:r>
-              <a:rPr lang="ru-RU" smtClean="0"/>
+              <a:rPr lang="ru-RU"/>
               <a:t>Образец текста</a:t>
             </a:r>
           </a:p>
@@ -3945,20 +3831,13 @@
     </p:spTree>
     <p:extLst>
       <p:ext uri="{BB962C8B-B14F-4D97-AF65-F5344CB8AC3E}">
-        <p14:creationId xmlns="" xmlns:p14="http://schemas.microsoft.com/office/powerpoint/2010/main" val="3169390267"/>
+        <p14:creationId xmlns:p14="http://schemas.microsoft.com/office/powerpoint/2010/main" val="3169390267"/>
       </p:ext>
     </p:extLst>
   </p:cSld>
   <p:clrMapOvr>
     <a:masterClrMapping/>
   </p:clrMapOvr>
-  <p:timing>
-    <p:tnLst>
-      <p:par>
-        <p:cTn id="1" dur="indefinite" restart="never" nodeType="tmRoot"/>
-      </p:par>
-    </p:tnLst>
-  </p:timing>
 </p:sldLayout>
 </file>
 
@@ -4003,7 +3882,7 @@
           <a:lstStyle/>
           <a:p>
             <a:r>
-              <a:rPr lang="ru-RU" smtClean="0"/>
+              <a:rPr lang="ru-RU"/>
               <a:t>Образец заголовка</a:t>
             </a:r>
             <a:endParaRPr lang="en-US" dirty="0"/>
@@ -4040,35 +3919,35 @@
           <a:p>
             <a:pPr lvl="0"/>
             <a:r>
-              <a:rPr lang="ru-RU" smtClean="0"/>
+              <a:rPr lang="ru-RU"/>
               <a:t>Образец текста</a:t>
             </a:r>
           </a:p>
           <a:p>
             <a:pPr lvl="1"/>
             <a:r>
-              <a:rPr lang="ru-RU" smtClean="0"/>
+              <a:rPr lang="ru-RU"/>
               <a:t>Второй уровень</a:t>
             </a:r>
           </a:p>
           <a:p>
             <a:pPr lvl="2"/>
             <a:r>
-              <a:rPr lang="ru-RU" smtClean="0"/>
+              <a:rPr lang="ru-RU"/>
               <a:t>Третий уровень</a:t>
             </a:r>
           </a:p>
           <a:p>
             <a:pPr lvl="3"/>
             <a:r>
-              <a:rPr lang="ru-RU" smtClean="0"/>
+              <a:rPr lang="ru-RU"/>
               <a:t>Четвертый уровень</a:t>
             </a:r>
           </a:p>
           <a:p>
             <a:pPr lvl="4"/>
             <a:r>
-              <a:rPr lang="ru-RU" smtClean="0"/>
+              <a:rPr lang="ru-RU"/>
               <a:t>Пятый уровень</a:t>
             </a:r>
             <a:endParaRPr lang="en-US" dirty="0"/>
@@ -4098,7 +3977,7 @@
             <a:fld id="{F317DF22-5C92-4FF1-A01C-A0CD364556D9}" type="datetime1">
               <a:rPr lang="pl-PL" smtClean="0"/>
               <a:pPr/>
-              <a:t>2020-01-27</a:t>
+              <a:t>27.01.2020</a:t>
             </a:fld>
             <a:endParaRPr lang="pl-PL"/>
           </a:p>
@@ -4133,7 +4012,7 @@
           <p:cNvPr id="10" name="image7.png">
             <a:extLst>
               <a:ext uri="{FF2B5EF4-FFF2-40B4-BE49-F238E27FC236}">
-                <a16:creationId xmlns="" xmlns:a16="http://schemas.microsoft.com/office/drawing/2014/main" id="{8F638F12-3CB3-453E-B9E9-400A619287F9}"/>
+                <a16:creationId xmlns:a16="http://schemas.microsoft.com/office/drawing/2014/main" id="{8F638F12-3CB3-453E-B9E9-400A619287F9}"/>
               </a:ext>
             </a:extLst>
           </p:cNvPr>
@@ -4143,9 +4022,7 @@
           <p:nvPr userDrawn="1"/>
         </p:nvPicPr>
         <p:blipFill>
-          <a:blip r:embed="rId2" cstate="print">
-            <a:extLst/>
-          </a:blip>
+          <a:blip r:embed="rId2" cstate="print"/>
           <a:stretch>
             <a:fillRect/>
           </a:stretch>
@@ -4214,20 +4091,13 @@
     </p:spTree>
     <p:extLst>
       <p:ext uri="{BB962C8B-B14F-4D97-AF65-F5344CB8AC3E}">
-        <p14:creationId xmlns="" xmlns:p14="http://schemas.microsoft.com/office/powerpoint/2010/main" val="21210863"/>
+        <p14:creationId xmlns:p14="http://schemas.microsoft.com/office/powerpoint/2010/main" val="21210863"/>
       </p:ext>
     </p:extLst>
   </p:cSld>
   <p:clrMapOvr>
     <a:masterClrMapping/>
   </p:clrMapOvr>
-  <p:timing>
-    <p:tnLst>
-      <p:par>
-        <p:cTn id="1" dur="indefinite" restart="never" nodeType="tmRoot"/>
-      </p:par>
-    </p:tnLst>
-  </p:timing>
   <p:hf hdr="0" ftr="0" dt="0"/>
 </p:sldLayout>
 </file>
@@ -4265,7 +4135,7 @@
           <a:lstStyle/>
           <a:p>
             <a:r>
-              <a:rPr lang="ru-RU" smtClean="0"/>
+              <a:rPr lang="ru-RU"/>
               <a:t>Образец заголовка</a:t>
             </a:r>
             <a:endParaRPr lang="en-US" dirty="0"/>
@@ -4294,35 +4164,35 @@
           <a:p>
             <a:pPr lvl="0"/>
             <a:r>
-              <a:rPr lang="ru-RU" smtClean="0"/>
+              <a:rPr lang="ru-RU"/>
               <a:t>Образец текста</a:t>
             </a:r>
           </a:p>
           <a:p>
             <a:pPr lvl="1"/>
             <a:r>
-              <a:rPr lang="ru-RU" smtClean="0"/>
+              <a:rPr lang="ru-RU"/>
               <a:t>Второй уровень</a:t>
             </a:r>
           </a:p>
           <a:p>
             <a:pPr lvl="2"/>
             <a:r>
-              <a:rPr lang="ru-RU" smtClean="0"/>
+              <a:rPr lang="ru-RU"/>
               <a:t>Третий уровень</a:t>
             </a:r>
           </a:p>
           <a:p>
             <a:pPr lvl="3"/>
             <a:r>
-              <a:rPr lang="ru-RU" smtClean="0"/>
+              <a:rPr lang="ru-RU"/>
               <a:t>Четвертый уровень</a:t>
             </a:r>
           </a:p>
           <a:p>
             <a:pPr lvl="4"/>
             <a:r>
-              <a:rPr lang="ru-RU" smtClean="0"/>
+              <a:rPr lang="ru-RU"/>
               <a:t>Пятый уровень</a:t>
             </a:r>
             <a:endParaRPr lang="en-US" dirty="0"/>
@@ -4351,35 +4221,35 @@
           <a:p>
             <a:pPr lvl="0"/>
             <a:r>
-              <a:rPr lang="ru-RU" smtClean="0"/>
+              <a:rPr lang="ru-RU"/>
               <a:t>Образец текста</a:t>
             </a:r>
           </a:p>
           <a:p>
             <a:pPr lvl="1"/>
             <a:r>
-              <a:rPr lang="ru-RU" smtClean="0"/>
+              <a:rPr lang="ru-RU"/>
               <a:t>Второй уровень</a:t>
             </a:r>
           </a:p>
           <a:p>
             <a:pPr lvl="2"/>
             <a:r>
-              <a:rPr lang="ru-RU" smtClean="0"/>
+              <a:rPr lang="ru-RU"/>
               <a:t>Третий уровень</a:t>
             </a:r>
           </a:p>
           <a:p>
             <a:pPr lvl="3"/>
             <a:r>
-              <a:rPr lang="ru-RU" smtClean="0"/>
+              <a:rPr lang="ru-RU"/>
               <a:t>Четвертый уровень</a:t>
             </a:r>
           </a:p>
           <a:p>
             <a:pPr lvl="4"/>
             <a:r>
-              <a:rPr lang="ru-RU" smtClean="0"/>
+              <a:rPr lang="ru-RU"/>
               <a:t>Пятый уровень</a:t>
             </a:r>
             <a:endParaRPr lang="en-US" dirty="0"/>
@@ -4404,7 +4274,7 @@
             <a:fld id="{034BFD8B-8FC8-4F4A-B5F7-5717190F435F}" type="datetime1">
               <a:rPr lang="pl-PL" smtClean="0"/>
               <a:pPr/>
-              <a:t>2020-01-27</a:t>
+              <a:t>27.01.2020</a:t>
             </a:fld>
             <a:endParaRPr lang="pl-PL"/>
           </a:p>
@@ -4485,20 +4355,13 @@
     </p:spTree>
     <p:extLst>
       <p:ext uri="{BB962C8B-B14F-4D97-AF65-F5344CB8AC3E}">
-        <p14:creationId xmlns="" xmlns:p14="http://schemas.microsoft.com/office/powerpoint/2010/main" val="4248738930"/>
+        <p14:creationId xmlns:p14="http://schemas.microsoft.com/office/powerpoint/2010/main" val="4248738930"/>
       </p:ext>
     </p:extLst>
   </p:cSld>
   <p:clrMapOvr>
     <a:masterClrMapping/>
   </p:clrMapOvr>
-  <p:timing>
-    <p:tnLst>
-      <p:par>
-        <p:cTn id="1" dur="indefinite" restart="never" nodeType="tmRoot"/>
-      </p:par>
-    </p:tnLst>
-  </p:timing>
 </p:sldLayout>
 </file>
 
@@ -4540,7 +4403,7 @@
           <a:lstStyle/>
           <a:p>
             <a:r>
-              <a:rPr lang="ru-RU" smtClean="0"/>
+              <a:rPr lang="ru-RU"/>
               <a:t>Образец заголовка</a:t>
             </a:r>
             <a:endParaRPr lang="en-US" dirty="0"/>
@@ -4606,7 +4469,7 @@
           <a:p>
             <a:pPr lvl="0"/>
             <a:r>
-              <a:rPr lang="ru-RU" smtClean="0"/>
+              <a:rPr lang="ru-RU"/>
               <a:t>Образец текста</a:t>
             </a:r>
           </a:p>
@@ -4634,35 +4497,35 @@
           <a:p>
             <a:pPr lvl="0"/>
             <a:r>
-              <a:rPr lang="ru-RU" smtClean="0"/>
+              <a:rPr lang="ru-RU"/>
               <a:t>Образец текста</a:t>
             </a:r>
           </a:p>
           <a:p>
             <a:pPr lvl="1"/>
             <a:r>
-              <a:rPr lang="ru-RU" smtClean="0"/>
+              <a:rPr lang="ru-RU"/>
               <a:t>Второй уровень</a:t>
             </a:r>
           </a:p>
           <a:p>
             <a:pPr lvl="2"/>
             <a:r>
-              <a:rPr lang="ru-RU" smtClean="0"/>
+              <a:rPr lang="ru-RU"/>
               <a:t>Третий уровень</a:t>
             </a:r>
           </a:p>
           <a:p>
             <a:pPr lvl="3"/>
             <a:r>
-              <a:rPr lang="ru-RU" smtClean="0"/>
+              <a:rPr lang="ru-RU"/>
               <a:t>Четвертый уровень</a:t>
             </a:r>
           </a:p>
           <a:p>
             <a:pPr lvl="4"/>
             <a:r>
-              <a:rPr lang="ru-RU" smtClean="0"/>
+              <a:rPr lang="ru-RU"/>
               <a:t>Пятый уровень</a:t>
             </a:r>
             <a:endParaRPr lang="en-US" dirty="0"/>
@@ -4728,7 +4591,7 @@
           <a:p>
             <a:pPr lvl="0"/>
             <a:r>
-              <a:rPr lang="ru-RU" smtClean="0"/>
+              <a:rPr lang="ru-RU"/>
               <a:t>Образец текста</a:t>
             </a:r>
           </a:p>
@@ -4756,35 +4619,35 @@
           <a:p>
             <a:pPr lvl="0"/>
             <a:r>
-              <a:rPr lang="ru-RU" smtClean="0"/>
+              <a:rPr lang="ru-RU"/>
               <a:t>Образец текста</a:t>
             </a:r>
           </a:p>
           <a:p>
             <a:pPr lvl="1"/>
             <a:r>
-              <a:rPr lang="ru-RU" smtClean="0"/>
+              <a:rPr lang="ru-RU"/>
               <a:t>Второй уровень</a:t>
             </a:r>
           </a:p>
           <a:p>
             <a:pPr lvl="2"/>
             <a:r>
-              <a:rPr lang="ru-RU" smtClean="0"/>
+              <a:rPr lang="ru-RU"/>
               <a:t>Третий уровень</a:t>
             </a:r>
           </a:p>
           <a:p>
             <a:pPr lvl="3"/>
             <a:r>
-              <a:rPr lang="ru-RU" smtClean="0"/>
+              <a:rPr lang="ru-RU"/>
               <a:t>Четвертый уровень</a:t>
             </a:r>
           </a:p>
           <a:p>
             <a:pPr lvl="4"/>
             <a:r>
-              <a:rPr lang="ru-RU" smtClean="0"/>
+              <a:rPr lang="ru-RU"/>
               <a:t>Пятый уровень</a:t>
             </a:r>
             <a:endParaRPr lang="en-US" dirty="0"/>
@@ -4809,7 +4672,7 @@
             <a:fld id="{66AE723E-EAE5-4335-92DD-06D87F82E55F}" type="datetime1">
               <a:rPr lang="pl-PL" smtClean="0"/>
               <a:pPr/>
-              <a:t>2020-01-27</a:t>
+              <a:t>27.01.2020</a:t>
             </a:fld>
             <a:endParaRPr lang="pl-PL"/>
           </a:p>
@@ -4885,20 +4748,13 @@
     </p:spTree>
     <p:extLst>
       <p:ext uri="{BB962C8B-B14F-4D97-AF65-F5344CB8AC3E}">
-        <p14:creationId xmlns="" xmlns:p14="http://schemas.microsoft.com/office/powerpoint/2010/main" val="450556213"/>
+        <p14:creationId xmlns:p14="http://schemas.microsoft.com/office/powerpoint/2010/main" val="450556213"/>
       </p:ext>
     </p:extLst>
   </p:cSld>
   <p:clrMapOvr>
     <a:masterClrMapping/>
   </p:clrMapOvr>
-  <p:timing>
-    <p:tnLst>
-      <p:par>
-        <p:cTn id="1" dur="indefinite" restart="never" nodeType="tmRoot"/>
-      </p:par>
-    </p:tnLst>
-  </p:timing>
 </p:sldLayout>
 </file>
 
@@ -4935,7 +4791,7 @@
           <a:lstStyle/>
           <a:p>
             <a:r>
-              <a:rPr lang="ru-RU" smtClean="0"/>
+              <a:rPr lang="ru-RU"/>
               <a:t>Образец заголовка</a:t>
             </a:r>
             <a:endParaRPr lang="en-US" dirty="0"/>
@@ -4960,7 +4816,7 @@
             <a:fld id="{38D5FE76-9559-491F-B605-0D9B04EE9DE6}" type="datetime1">
               <a:rPr lang="pl-PL" smtClean="0"/>
               <a:pPr/>
-              <a:t>2020-01-27</a:t>
+              <a:t>27.01.2020</a:t>
             </a:fld>
             <a:endParaRPr lang="pl-PL"/>
           </a:p>
@@ -5014,14 +4870,12 @@
           <p:cNvPr id="8" name="Table 93">
             <a:extLst>
               <a:ext uri="{FF2B5EF4-FFF2-40B4-BE49-F238E27FC236}">
-                <a16:creationId xmlns="" xmlns:a16="http://schemas.microsoft.com/office/drawing/2014/main" id="{63861C41-A286-4CBE-9EBF-DBE851D12C0E}"/>
+                <a16:creationId xmlns:a16="http://schemas.microsoft.com/office/drawing/2014/main" id="{63861C41-A286-4CBE-9EBF-DBE851D12C0E}"/>
               </a:ext>
             </a:extLst>
           </p:cNvPr>
           <p:cNvGraphicFramePr/>
-          <p:nvPr userDrawn="1">
-            <p:extLst/>
-          </p:nvPr>
+          <p:nvPr userDrawn="1"/>
         </p:nvGraphicFramePr>
         <p:xfrm>
           <a:off x="2002036" y="1828802"/>
@@ -5035,28 +4889,28 @@
                 <a:gridCol w="1284685">
                   <a:extLst>
                     <a:ext uri="{9D8B030D-6E8A-4147-A177-3AD203B41FA5}">
-                      <a16:colId xmlns="" xmlns:a16="http://schemas.microsoft.com/office/drawing/2014/main" val="20000"/>
+                      <a16:colId xmlns:a16="http://schemas.microsoft.com/office/drawing/2014/main" val="20000"/>
                     </a:ext>
                   </a:extLst>
                 </a:gridCol>
                 <a:gridCol w="1284685">
                   <a:extLst>
                     <a:ext uri="{9D8B030D-6E8A-4147-A177-3AD203B41FA5}">
-                      <a16:colId xmlns="" xmlns:a16="http://schemas.microsoft.com/office/drawing/2014/main" val="20001"/>
+                      <a16:colId xmlns:a16="http://schemas.microsoft.com/office/drawing/2014/main" val="20001"/>
                     </a:ext>
                   </a:extLst>
                 </a:gridCol>
                 <a:gridCol w="1284685">
                   <a:extLst>
                     <a:ext uri="{9D8B030D-6E8A-4147-A177-3AD203B41FA5}">
-                      <a16:colId xmlns="" xmlns:a16="http://schemas.microsoft.com/office/drawing/2014/main" val="20002"/>
+                      <a16:colId xmlns:a16="http://schemas.microsoft.com/office/drawing/2014/main" val="20002"/>
                     </a:ext>
                   </a:extLst>
                 </a:gridCol>
                 <a:gridCol w="1284685">
                   <a:extLst>
                     <a:ext uri="{9D8B030D-6E8A-4147-A177-3AD203B41FA5}">
-                      <a16:colId xmlns="" xmlns:a16="http://schemas.microsoft.com/office/drawing/2014/main" val="20003"/>
+                      <a16:colId xmlns:a16="http://schemas.microsoft.com/office/drawing/2014/main" val="20003"/>
                     </a:ext>
                   </a:extLst>
                 </a:gridCol>
@@ -5352,7 +5206,7 @@
                 </a:tc>
                 <a:extLst>
                   <a:ext uri="{0D108BD9-81ED-4DB2-BD59-A6C34878D82A}">
-                    <a16:rowId xmlns="" xmlns:a16="http://schemas.microsoft.com/office/drawing/2014/main" val="10000"/>
+                    <a16:rowId xmlns:a16="http://schemas.microsoft.com/office/drawing/2014/main" val="10000"/>
                   </a:ext>
                 </a:extLst>
               </a:tr>
@@ -5619,7 +5473,7 @@
                 </a:tc>
                 <a:extLst>
                   <a:ext uri="{0D108BD9-81ED-4DB2-BD59-A6C34878D82A}">
-                    <a16:rowId xmlns="" xmlns:a16="http://schemas.microsoft.com/office/drawing/2014/main" val="10001"/>
+                    <a16:rowId xmlns:a16="http://schemas.microsoft.com/office/drawing/2014/main" val="10001"/>
                   </a:ext>
                 </a:extLst>
               </a:tr>
@@ -5886,7 +5740,7 @@
                 </a:tc>
                 <a:extLst>
                   <a:ext uri="{0D108BD9-81ED-4DB2-BD59-A6C34878D82A}">
-                    <a16:rowId xmlns="" xmlns:a16="http://schemas.microsoft.com/office/drawing/2014/main" val="10002"/>
+                    <a16:rowId xmlns:a16="http://schemas.microsoft.com/office/drawing/2014/main" val="10002"/>
                   </a:ext>
                 </a:extLst>
               </a:tr>
@@ -6153,7 +6007,7 @@
                 </a:tc>
                 <a:extLst>
                   <a:ext uri="{0D108BD9-81ED-4DB2-BD59-A6C34878D82A}">
-                    <a16:rowId xmlns="" xmlns:a16="http://schemas.microsoft.com/office/drawing/2014/main" val="10003"/>
+                    <a16:rowId xmlns:a16="http://schemas.microsoft.com/office/drawing/2014/main" val="10003"/>
                   </a:ext>
                 </a:extLst>
               </a:tr>
@@ -6420,7 +6274,7 @@
                 </a:tc>
                 <a:extLst>
                   <a:ext uri="{0D108BD9-81ED-4DB2-BD59-A6C34878D82A}">
-                    <a16:rowId xmlns="" xmlns:a16="http://schemas.microsoft.com/office/drawing/2014/main" val="10004"/>
+                    <a16:rowId xmlns:a16="http://schemas.microsoft.com/office/drawing/2014/main" val="10004"/>
                   </a:ext>
                 </a:extLst>
               </a:tr>
@@ -6455,20 +6309,13 @@
     </p:spTree>
     <p:extLst>
       <p:ext uri="{BB962C8B-B14F-4D97-AF65-F5344CB8AC3E}">
-        <p14:creationId xmlns="" xmlns:p14="http://schemas.microsoft.com/office/powerpoint/2010/main" val="2198356140"/>
+        <p14:creationId xmlns:p14="http://schemas.microsoft.com/office/powerpoint/2010/main" val="2198356140"/>
       </p:ext>
     </p:extLst>
   </p:cSld>
   <p:clrMapOvr>
     <a:masterClrMapping/>
   </p:clrMapOvr>
-  <p:timing>
-    <p:tnLst>
-      <p:par>
-        <p:cTn id="1" dur="indefinite" restart="never" nodeType="tmRoot"/>
-      </p:par>
-    </p:tnLst>
-  </p:timing>
 </p:sldLayout>
 </file>
 
@@ -6505,7 +6352,7 @@
           <a:lstStyle/>
           <a:p>
             <a:r>
-              <a:rPr lang="ru-RU" smtClean="0"/>
+              <a:rPr lang="ru-RU"/>
               <a:t>Образец заголовка</a:t>
             </a:r>
             <a:endParaRPr lang="en-US" dirty="0"/>
@@ -6530,7 +6377,7 @@
             <a:fld id="{CF03277E-5176-4437-BE75-1B9436FABD5E}" type="datetime1">
               <a:rPr lang="pl-PL" smtClean="0"/>
               <a:pPr/>
-              <a:t>2020-01-27</a:t>
+              <a:t>27.01.2020</a:t>
             </a:fld>
             <a:endParaRPr lang="pl-PL"/>
           </a:p>
@@ -6606,20 +6453,13 @@
     </p:spTree>
     <p:extLst>
       <p:ext uri="{BB962C8B-B14F-4D97-AF65-F5344CB8AC3E}">
-        <p14:creationId xmlns="" xmlns:p14="http://schemas.microsoft.com/office/powerpoint/2010/main" val="2110611794"/>
+        <p14:creationId xmlns:p14="http://schemas.microsoft.com/office/powerpoint/2010/main" val="2110611794"/>
       </p:ext>
     </p:extLst>
   </p:cSld>
   <p:clrMapOvr>
     <a:masterClrMapping/>
   </p:clrMapOvr>
-  <p:timing>
-    <p:tnLst>
-      <p:par>
-        <p:cTn id="1" dur="indefinite" restart="never" nodeType="tmRoot"/>
-      </p:par>
-    </p:tnLst>
-  </p:timing>
 </p:sldLayout>
 </file>
 
@@ -6658,7 +6498,7 @@
             <a:fld id="{86CDFF25-1611-478C-925A-E740B0D667B2}" type="datetime1">
               <a:rPr lang="pl-PL" smtClean="0"/>
               <a:pPr/>
-              <a:t>2020-01-27</a:t>
+              <a:t>27.01.2020</a:t>
             </a:fld>
             <a:endParaRPr lang="pl-PL"/>
           </a:p>
@@ -6734,20 +6574,13 @@
     </p:spTree>
     <p:extLst>
       <p:ext uri="{BB962C8B-B14F-4D97-AF65-F5344CB8AC3E}">
-        <p14:creationId xmlns="" xmlns:p14="http://schemas.microsoft.com/office/powerpoint/2010/main" val="4233766534"/>
+        <p14:creationId xmlns:p14="http://schemas.microsoft.com/office/powerpoint/2010/main" val="4233766534"/>
       </p:ext>
     </p:extLst>
   </p:cSld>
   <p:clrMapOvr>
     <a:masterClrMapping/>
   </p:clrMapOvr>
-  <p:timing>
-    <p:tnLst>
-      <p:par>
-        <p:cTn id="1" dur="indefinite" restart="never" nodeType="tmRoot"/>
-      </p:par>
-    </p:tnLst>
-  </p:timing>
 </p:sldLayout>
 </file>
 
@@ -6781,7 +6614,7 @@
           <p:cNvPr id="8" name="image4.png">
             <a:extLst>
               <a:ext uri="{FF2B5EF4-FFF2-40B4-BE49-F238E27FC236}">
-                <a16:creationId xmlns="" xmlns:a16="http://schemas.microsoft.com/office/drawing/2014/main" id="{6A74313D-41E1-4A01-8C8A-EAEBAD82B8CB}"/>
+                <a16:creationId xmlns:a16="http://schemas.microsoft.com/office/drawing/2014/main" id="{6A74313D-41E1-4A01-8C8A-EAEBAD82B8CB}"/>
               </a:ext>
             </a:extLst>
           </p:cNvPr>
@@ -6791,9 +6624,7 @@
           <p:nvPr/>
         </p:nvPicPr>
         <p:blipFill>
-          <a:blip r:embed="rId2" cstate="print">
-            <a:extLst/>
-          </a:blip>
+          <a:blip r:embed="rId2" cstate="print"/>
           <a:stretch>
             <a:fillRect/>
           </a:stretch>
@@ -6816,7 +6647,7 @@
           <p:cNvPr id="12" name="image5.png">
             <a:extLst>
               <a:ext uri="{FF2B5EF4-FFF2-40B4-BE49-F238E27FC236}">
-                <a16:creationId xmlns="" xmlns:a16="http://schemas.microsoft.com/office/drawing/2014/main" id="{DBDB269D-8575-4836-BCDF-28DD1A792646}"/>
+                <a16:creationId xmlns:a16="http://schemas.microsoft.com/office/drawing/2014/main" id="{DBDB269D-8575-4836-BCDF-28DD1A792646}"/>
               </a:ext>
             </a:extLst>
           </p:cNvPr>
@@ -6826,9 +6657,7 @@
           <p:nvPr/>
         </p:nvPicPr>
         <p:blipFill>
-          <a:blip r:embed="rId3" cstate="print">
-            <a:extLst/>
-          </a:blip>
+          <a:blip r:embed="rId3" cstate="print"/>
           <a:stretch>
             <a:fillRect/>
           </a:stretch>
@@ -6878,7 +6707,7 @@
           </a:lstStyle>
           <a:p>
             <a:r>
-              <a:rPr lang="ru-RU" smtClean="0"/>
+              <a:rPr lang="ru-RU"/>
               <a:t>Образец заголовка</a:t>
             </a:r>
             <a:endParaRPr lang="en-US" dirty="0"/>
@@ -6950,7 +6779,7 @@
           </a:lstStyle>
           <a:p>
             <a:r>
-              <a:rPr lang="ru-RU" smtClean="0"/>
+              <a:rPr lang="ru-RU"/>
               <a:t>Образец подзаголовка</a:t>
             </a:r>
             <a:endParaRPr lang="en-US" dirty="0"/>
@@ -6984,20 +6813,13 @@
     </p:spTree>
     <p:extLst>
       <p:ext uri="{BB962C8B-B14F-4D97-AF65-F5344CB8AC3E}">
-        <p14:creationId xmlns="" xmlns:p14="http://schemas.microsoft.com/office/powerpoint/2010/main" val="1203733597"/>
+        <p14:creationId xmlns:p14="http://schemas.microsoft.com/office/powerpoint/2010/main" val="1203733597"/>
       </p:ext>
     </p:extLst>
   </p:cSld>
   <p:clrMapOvr>
     <a:overrideClrMapping bg1="lt1" tx1="dk1" bg2="lt2" tx2="dk2" accent1="accent1" accent2="accent2" accent3="accent3" accent4="accent4" accent5="accent5" accent6="accent6" hlink="hlink" folHlink="folHlink"/>
   </p:clrMapOvr>
-  <p:timing>
-    <p:tnLst>
-      <p:par>
-        <p:cTn id="1" dur="indefinite" restart="never" nodeType="tmRoot"/>
-      </p:par>
-    </p:tnLst>
-  </p:timing>
 </p:sldLayout>
 </file>
 
@@ -7043,7 +6865,7 @@
           </a:lstStyle>
           <a:p>
             <a:r>
-              <a:rPr lang="ru-RU" smtClean="0"/>
+              <a:rPr lang="ru-RU"/>
               <a:t>Образец заголовка</a:t>
             </a:r>
             <a:endParaRPr lang="en-US" dirty="0"/>
@@ -7100,35 +6922,35 @@
           <a:p>
             <a:pPr lvl="0"/>
             <a:r>
-              <a:rPr lang="ru-RU" smtClean="0"/>
+              <a:rPr lang="ru-RU"/>
               <a:t>Образец текста</a:t>
             </a:r>
           </a:p>
           <a:p>
             <a:pPr lvl="1"/>
             <a:r>
-              <a:rPr lang="ru-RU" smtClean="0"/>
+              <a:rPr lang="ru-RU"/>
               <a:t>Второй уровень</a:t>
             </a:r>
           </a:p>
           <a:p>
             <a:pPr lvl="2"/>
             <a:r>
-              <a:rPr lang="ru-RU" smtClean="0"/>
+              <a:rPr lang="ru-RU"/>
               <a:t>Третий уровень</a:t>
             </a:r>
           </a:p>
           <a:p>
             <a:pPr lvl="3"/>
             <a:r>
-              <a:rPr lang="ru-RU" smtClean="0"/>
+              <a:rPr lang="ru-RU"/>
               <a:t>Четвертый уровень</a:t>
             </a:r>
           </a:p>
           <a:p>
             <a:pPr lvl="4"/>
             <a:r>
-              <a:rPr lang="ru-RU" smtClean="0"/>
+              <a:rPr lang="ru-RU"/>
               <a:t>Пятый уровень</a:t>
             </a:r>
             <a:endParaRPr lang="en-US" dirty="0"/>
@@ -7194,7 +7016,7 @@
           <a:p>
             <a:pPr lvl="0"/>
             <a:r>
-              <a:rPr lang="ru-RU" smtClean="0"/>
+              <a:rPr lang="ru-RU"/>
               <a:t>Образец текста</a:t>
             </a:r>
           </a:p>
@@ -7218,7 +7040,7 @@
             <a:fld id="{60276E08-4478-416B-B2F0-E483D383A9AC}" type="datetime1">
               <a:rPr lang="pl-PL" smtClean="0"/>
               <a:pPr/>
-              <a:t>2020-01-27</a:t>
+              <a:t>27.01.2020</a:t>
             </a:fld>
             <a:endParaRPr lang="pl-PL"/>
           </a:p>
@@ -7294,20 +7116,13 @@
     </p:spTree>
     <p:extLst>
       <p:ext uri="{BB962C8B-B14F-4D97-AF65-F5344CB8AC3E}">
-        <p14:creationId xmlns="" xmlns:p14="http://schemas.microsoft.com/office/powerpoint/2010/main" val="4076054971"/>
+        <p14:creationId xmlns:p14="http://schemas.microsoft.com/office/powerpoint/2010/main" val="4076054971"/>
       </p:ext>
     </p:extLst>
   </p:cSld>
   <p:clrMapOvr>
     <a:masterClrMapping/>
   </p:clrMapOvr>
-  <p:timing>
-    <p:tnLst>
-      <p:par>
-        <p:cTn id="1" dur="indefinite" restart="never" nodeType="tmRoot"/>
-      </p:par>
-    </p:tnLst>
-  </p:timing>
 </p:sldLayout>
 </file>
 
@@ -7353,7 +7168,7 @@
           </a:lstStyle>
           <a:p>
             <a:r>
-              <a:rPr lang="ru-RU" smtClean="0"/>
+              <a:rPr lang="ru-RU"/>
               <a:t>Образец заголовка</a:t>
             </a:r>
             <a:endParaRPr lang="en-US" dirty="0"/>
@@ -7418,7 +7233,7 @@
           </a:lstStyle>
           <a:p>
             <a:r>
-              <a:rPr lang="ru-RU" smtClean="0"/>
+              <a:rPr lang="ru-RU"/>
               <a:t>Вставка рисунка</a:t>
             </a:r>
             <a:endParaRPr lang="en-US" dirty="0"/>
@@ -7484,7 +7299,7 @@
           <a:p>
             <a:pPr lvl="0"/>
             <a:r>
-              <a:rPr lang="ru-RU" smtClean="0"/>
+              <a:rPr lang="ru-RU"/>
               <a:t>Образец текста</a:t>
             </a:r>
           </a:p>
@@ -7508,7 +7323,7 @@
             <a:fld id="{0CD773E7-2378-4EFB-8159-99C69053EDF7}" type="datetime1">
               <a:rPr lang="pl-PL" smtClean="0"/>
               <a:pPr/>
-              <a:t>2020-01-27</a:t>
+              <a:t>27.01.2020</a:t>
             </a:fld>
             <a:endParaRPr lang="pl-PL"/>
           </a:p>
@@ -7584,20 +7399,13 @@
     </p:spTree>
     <p:extLst>
       <p:ext uri="{BB962C8B-B14F-4D97-AF65-F5344CB8AC3E}">
-        <p14:creationId xmlns="" xmlns:p14="http://schemas.microsoft.com/office/powerpoint/2010/main" val="3193339812"/>
+        <p14:creationId xmlns:p14="http://schemas.microsoft.com/office/powerpoint/2010/main" val="3193339812"/>
       </p:ext>
     </p:extLst>
   </p:cSld>
   <p:clrMapOvr>
     <a:masterClrMapping/>
   </p:clrMapOvr>
-  <p:timing>
-    <p:tnLst>
-      <p:par>
-        <p:cTn id="1" dur="indefinite" restart="never" nodeType="tmRoot"/>
-      </p:par>
-    </p:tnLst>
-  </p:timing>
 </p:sldLayout>
 </file>
 
@@ -7658,7 +7466,7 @@
           <a:lstStyle/>
           <a:p>
             <a:r>
-              <a:rPr lang="ru-RU" smtClean="0"/>
+              <a:rPr lang="ru-RU"/>
               <a:t>Образец заголовка</a:t>
             </a:r>
             <a:endParaRPr lang="en-US" dirty="0"/>
@@ -7682,35 +7490,35 @@
           <a:p>
             <a:pPr lvl="0"/>
             <a:r>
-              <a:rPr lang="ru-RU" smtClean="0"/>
+              <a:rPr lang="ru-RU"/>
               <a:t>Образец текста</a:t>
             </a:r>
           </a:p>
           <a:p>
             <a:pPr lvl="1"/>
             <a:r>
-              <a:rPr lang="ru-RU" smtClean="0"/>
+              <a:rPr lang="ru-RU"/>
               <a:t>Второй уровень</a:t>
             </a:r>
           </a:p>
           <a:p>
             <a:pPr lvl="2"/>
             <a:r>
-              <a:rPr lang="ru-RU" smtClean="0"/>
+              <a:rPr lang="ru-RU"/>
               <a:t>Третий уровень</a:t>
             </a:r>
           </a:p>
           <a:p>
             <a:pPr lvl="3"/>
             <a:r>
-              <a:rPr lang="ru-RU" smtClean="0"/>
+              <a:rPr lang="ru-RU"/>
               <a:t>Четвертый уровень</a:t>
             </a:r>
           </a:p>
           <a:p>
             <a:pPr lvl="4"/>
             <a:r>
-              <a:rPr lang="ru-RU" smtClean="0"/>
+              <a:rPr lang="ru-RU"/>
               <a:t>Пятый уровень</a:t>
             </a:r>
             <a:endParaRPr lang="en-US" dirty="0"/>
@@ -7740,7 +7548,7 @@
             <a:fld id="{19EA7272-7C86-4C61-A8D1-42B38A9F41FA}" type="datetime1">
               <a:rPr lang="pl-PL" smtClean="0"/>
               <a:pPr/>
-              <a:t>2020-01-27</a:t>
+              <a:t>27.01.2020</a:t>
             </a:fld>
             <a:endParaRPr lang="pl-PL" dirty="0"/>
           </a:p>
@@ -7806,20 +7614,13 @@
     </p:spTree>
     <p:extLst>
       <p:ext uri="{BB962C8B-B14F-4D97-AF65-F5344CB8AC3E}">
-        <p14:creationId xmlns="" xmlns:p14="http://schemas.microsoft.com/office/powerpoint/2010/main" val="681566747"/>
+        <p14:creationId xmlns:p14="http://schemas.microsoft.com/office/powerpoint/2010/main" val="681566747"/>
       </p:ext>
     </p:extLst>
   </p:cSld>
   <p:clrMapOvr>
     <a:masterClrMapping/>
   </p:clrMapOvr>
-  <p:timing>
-    <p:tnLst>
-      <p:par>
-        <p:cTn id="1" dur="indefinite" restart="never" nodeType="tmRoot"/>
-      </p:par>
-    </p:tnLst>
-  </p:timing>
 </p:sldLayout>
 </file>
 
@@ -7885,7 +7686,7 @@
           <a:lstStyle/>
           <a:p>
             <a:r>
-              <a:rPr lang="ru-RU" smtClean="0"/>
+              <a:rPr lang="ru-RU"/>
               <a:t>Образец заголовка</a:t>
             </a:r>
             <a:endParaRPr lang="en-US" dirty="0"/>
@@ -7914,35 +7715,35 @@
           <a:p>
             <a:pPr lvl="0"/>
             <a:r>
-              <a:rPr lang="ru-RU" smtClean="0"/>
+              <a:rPr lang="ru-RU"/>
               <a:t>Образец текста</a:t>
             </a:r>
           </a:p>
           <a:p>
             <a:pPr lvl="1"/>
             <a:r>
-              <a:rPr lang="ru-RU" smtClean="0"/>
+              <a:rPr lang="ru-RU"/>
               <a:t>Второй уровень</a:t>
             </a:r>
           </a:p>
           <a:p>
             <a:pPr lvl="2"/>
             <a:r>
-              <a:rPr lang="ru-RU" smtClean="0"/>
+              <a:rPr lang="ru-RU"/>
               <a:t>Третий уровень</a:t>
             </a:r>
           </a:p>
           <a:p>
             <a:pPr lvl="3"/>
             <a:r>
-              <a:rPr lang="ru-RU" smtClean="0"/>
+              <a:rPr lang="ru-RU"/>
               <a:t>Четвертый уровень</a:t>
             </a:r>
           </a:p>
           <a:p>
             <a:pPr lvl="4"/>
             <a:r>
-              <a:rPr lang="ru-RU" smtClean="0"/>
+              <a:rPr lang="ru-RU"/>
               <a:t>Пятый уровень</a:t>
             </a:r>
             <a:endParaRPr lang="en-US" dirty="0"/>
@@ -7972,7 +7773,7 @@
             <a:fld id="{346FA071-7161-4BEC-938E-7B7DA67F8CEF}" type="datetime1">
               <a:rPr lang="pl-PL" smtClean="0"/>
               <a:pPr/>
-              <a:t>2020-01-27</a:t>
+              <a:t>27.01.2020</a:t>
             </a:fld>
             <a:endParaRPr lang="pl-PL" dirty="0"/>
           </a:p>
@@ -8034,20 +7835,13 @@
     </p:spTree>
     <p:extLst>
       <p:ext uri="{BB962C8B-B14F-4D97-AF65-F5344CB8AC3E}">
-        <p14:creationId xmlns="" xmlns:p14="http://schemas.microsoft.com/office/powerpoint/2010/main" val="3356747349"/>
+        <p14:creationId xmlns:p14="http://schemas.microsoft.com/office/powerpoint/2010/main" val="3356747349"/>
       </p:ext>
     </p:extLst>
   </p:cSld>
   <p:clrMapOvr>
     <a:masterClrMapping/>
   </p:clrMapOvr>
-  <p:timing>
-    <p:tnLst>
-      <p:par>
-        <p:cTn id="1" dur="indefinite" restart="never" nodeType="tmRoot"/>
-      </p:par>
-    </p:tnLst>
-  </p:timing>
 </p:sldLayout>
 </file>
 
@@ -8077,9 +7871,7 @@
           <p:nvPr userDrawn="1"/>
         </p:nvPicPr>
         <p:blipFill rotWithShape="1">
-          <a:blip r:embed="rId2" cstate="print">
-            <a:extLst/>
-          </a:blip>
+          <a:blip r:embed="rId2" cstate="print"/>
           <a:srcRect l="14557" t="-172" r="14806" b="172"/>
           <a:stretch/>
         </p:blipFill>
@@ -8156,7 +7948,7 @@
             <a:fld id="{D535FD4E-F1C3-4B4E-BCF3-0BBE06B1D104}" type="datetime1">
               <a:rPr lang="pl-PL" smtClean="0"/>
               <a:pPr/>
-              <a:t>2020-01-27</a:t>
+              <a:t>27.01.2020</a:t>
             </a:fld>
             <a:endParaRPr lang="pl-PL"/>
           </a:p>
@@ -8218,7 +8010,7 @@
               </a:spcBef>
             </a:pPr>
             <a:r>
-              <a:rPr lang="ru-RU" dirty="0" smtClean="0"/>
+              <a:rPr lang="ru-RU" dirty="0"/>
               <a:t>Образец текста</a:t>
             </a:r>
           </a:p>
@@ -8229,7 +8021,7 @@
               </a:spcBef>
             </a:pPr>
             <a:r>
-              <a:rPr lang="ru-RU" dirty="0" smtClean="0"/>
+              <a:rPr lang="ru-RU" dirty="0"/>
               <a:t>Второй уровень</a:t>
             </a:r>
           </a:p>
@@ -8240,7 +8032,7 @@
               </a:spcBef>
             </a:pPr>
             <a:r>
-              <a:rPr lang="ru-RU" dirty="0" smtClean="0"/>
+              <a:rPr lang="ru-RU" dirty="0"/>
               <a:t>Третий уровень</a:t>
             </a:r>
           </a:p>
@@ -8251,7 +8043,7 @@
               </a:spcBef>
             </a:pPr>
             <a:r>
-              <a:rPr lang="ru-RU" dirty="0" smtClean="0"/>
+              <a:rPr lang="ru-RU" dirty="0"/>
               <a:t>Четвертый уровень</a:t>
             </a:r>
           </a:p>
@@ -8284,20 +8076,13 @@
     </p:spTree>
     <p:extLst>
       <p:ext uri="{BB962C8B-B14F-4D97-AF65-F5344CB8AC3E}">
-        <p14:creationId xmlns="" xmlns:p14="http://schemas.microsoft.com/office/powerpoint/2010/main" val="2434793487"/>
+        <p14:creationId xmlns:p14="http://schemas.microsoft.com/office/powerpoint/2010/main" val="2434793487"/>
       </p:ext>
     </p:extLst>
   </p:cSld>
   <p:clrMapOvr>
     <a:masterClrMapping/>
   </p:clrMapOvr>
-  <p:timing>
-    <p:tnLst>
-      <p:par>
-        <p:cTn id="1" dur="indefinite" restart="never" nodeType="tmRoot"/>
-      </p:par>
-    </p:tnLst>
-  </p:timing>
 </p:sldLayout>
 </file>
 
@@ -8330,7 +8115,7 @@
           <a:blip r:embed="rId2" cstate="print">
             <a:extLst>
               <a:ext uri="{28A0092B-C50C-407E-A947-70E740481C1C}">
-                <a14:useLocalDpi xmlns="" xmlns:a14="http://schemas.microsoft.com/office/drawing/2010/main" val="0"/>
+                <a14:useLocalDpi xmlns:a14="http://schemas.microsoft.com/office/drawing/2010/main" val="0"/>
               </a:ext>
             </a:extLst>
           </a:blip>
@@ -8411,7 +8196,7 @@
             <a:fld id="{D319A22D-69A8-4F72-9A6F-9452D918D22C}" type="datetime1">
               <a:rPr lang="pl-PL" smtClean="0"/>
               <a:pPr/>
-              <a:t>2020-01-27</a:t>
+              <a:t>27.01.2020</a:t>
             </a:fld>
             <a:endParaRPr lang="pl-PL"/>
           </a:p>
@@ -8473,7 +8258,7 @@
               </a:spcBef>
             </a:pPr>
             <a:r>
-              <a:rPr lang="ru-RU" dirty="0" smtClean="0"/>
+              <a:rPr lang="ru-RU" dirty="0"/>
               <a:t>Образец текста</a:t>
             </a:r>
           </a:p>
@@ -8484,7 +8269,7 @@
               </a:spcBef>
             </a:pPr>
             <a:r>
-              <a:rPr lang="ru-RU" dirty="0" smtClean="0"/>
+              <a:rPr lang="ru-RU" dirty="0"/>
               <a:t>Второй уровень</a:t>
             </a:r>
           </a:p>
@@ -8495,7 +8280,7 @@
               </a:spcBef>
             </a:pPr>
             <a:r>
-              <a:rPr lang="ru-RU" dirty="0" smtClean="0"/>
+              <a:rPr lang="ru-RU" dirty="0"/>
               <a:t>Третий уровень</a:t>
             </a:r>
           </a:p>
@@ -8506,7 +8291,7 @@
               </a:spcBef>
             </a:pPr>
             <a:r>
-              <a:rPr lang="ru-RU" dirty="0" smtClean="0"/>
+              <a:rPr lang="ru-RU" dirty="0"/>
               <a:t>Четвертый уровень</a:t>
             </a:r>
           </a:p>
@@ -8539,20 +8324,13 @@
     </p:spTree>
     <p:extLst>
       <p:ext uri="{BB962C8B-B14F-4D97-AF65-F5344CB8AC3E}">
-        <p14:creationId xmlns="" xmlns:p14="http://schemas.microsoft.com/office/powerpoint/2010/main" val="3440502811"/>
+        <p14:creationId xmlns:p14="http://schemas.microsoft.com/office/powerpoint/2010/main" val="3440502811"/>
       </p:ext>
     </p:extLst>
   </p:cSld>
   <p:clrMapOvr>
     <a:masterClrMapping/>
   </p:clrMapOvr>
-  <p:timing>
-    <p:tnLst>
-      <p:par>
-        <p:cTn id="1" dur="indefinite" restart="never" nodeType="tmRoot"/>
-      </p:par>
-    </p:tnLst>
-  </p:timing>
 </p:sldLayout>
 </file>
 
@@ -8585,7 +8363,7 @@
           <a:blip r:embed="rId2" cstate="print">
             <a:extLst>
               <a:ext uri="{28A0092B-C50C-407E-A947-70E740481C1C}">
-                <a14:useLocalDpi xmlns="" xmlns:a14="http://schemas.microsoft.com/office/drawing/2010/main" val="0"/>
+                <a14:useLocalDpi xmlns:a14="http://schemas.microsoft.com/office/drawing/2010/main" val="0"/>
               </a:ext>
             </a:extLst>
           </a:blip>
@@ -8666,7 +8444,7 @@
             <a:fld id="{658DBF10-0C31-4D0E-A3AE-23BBC08849A0}" type="datetime1">
               <a:rPr lang="pl-PL" smtClean="0"/>
               <a:pPr/>
-              <a:t>2020-01-27</a:t>
+              <a:t>27.01.2020</a:t>
             </a:fld>
             <a:endParaRPr lang="pl-PL"/>
           </a:p>
@@ -8728,7 +8506,7 @@
               </a:spcBef>
             </a:pPr>
             <a:r>
-              <a:rPr lang="ru-RU" dirty="0" smtClean="0"/>
+              <a:rPr lang="ru-RU" dirty="0"/>
               <a:t>Образец текста</a:t>
             </a:r>
           </a:p>
@@ -8739,7 +8517,7 @@
               </a:spcBef>
             </a:pPr>
             <a:r>
-              <a:rPr lang="ru-RU" dirty="0" smtClean="0"/>
+              <a:rPr lang="ru-RU" dirty="0"/>
               <a:t>Второй уровень</a:t>
             </a:r>
           </a:p>
@@ -8750,7 +8528,7 @@
               </a:spcBef>
             </a:pPr>
             <a:r>
-              <a:rPr lang="ru-RU" dirty="0" smtClean="0"/>
+              <a:rPr lang="ru-RU" dirty="0"/>
               <a:t>Третий уровень</a:t>
             </a:r>
           </a:p>
@@ -8761,7 +8539,7 @@
               </a:spcBef>
             </a:pPr>
             <a:r>
-              <a:rPr lang="ru-RU" dirty="0" smtClean="0"/>
+              <a:rPr lang="ru-RU" dirty="0"/>
               <a:t>Четвертый уровень</a:t>
             </a:r>
           </a:p>
@@ -8794,20 +8572,13 @@
     </p:spTree>
     <p:extLst>
       <p:ext uri="{BB962C8B-B14F-4D97-AF65-F5344CB8AC3E}">
-        <p14:creationId xmlns="" xmlns:p14="http://schemas.microsoft.com/office/powerpoint/2010/main" val="2564545236"/>
+        <p14:creationId xmlns:p14="http://schemas.microsoft.com/office/powerpoint/2010/main" val="2564545236"/>
       </p:ext>
     </p:extLst>
   </p:cSld>
   <p:clrMapOvr>
     <a:masterClrMapping/>
   </p:clrMapOvr>
-  <p:timing>
-    <p:tnLst>
-      <p:par>
-        <p:cTn id="1" dur="indefinite" restart="never" nodeType="tmRoot"/>
-      </p:par>
-    </p:tnLst>
-  </p:timing>
 </p:sldLayout>
 </file>
 
@@ -8840,7 +8611,7 @@
           <a:blip r:embed="rId2" cstate="print">
             <a:extLst>
               <a:ext uri="{28A0092B-C50C-407E-A947-70E740481C1C}">
-                <a14:useLocalDpi xmlns="" xmlns:a14="http://schemas.microsoft.com/office/drawing/2010/main" val="0"/>
+                <a14:useLocalDpi xmlns:a14="http://schemas.microsoft.com/office/drawing/2010/main" val="0"/>
               </a:ext>
             </a:extLst>
           </a:blip>
@@ -8921,7 +8692,7 @@
             <a:fld id="{D97F7A4A-4302-472B-B494-B11FE5488642}" type="datetime1">
               <a:rPr lang="pl-PL" smtClean="0"/>
               <a:pPr/>
-              <a:t>2020-01-27</a:t>
+              <a:t>27.01.2020</a:t>
             </a:fld>
             <a:endParaRPr lang="pl-PL"/>
           </a:p>
@@ -8983,7 +8754,7 @@
               </a:spcBef>
             </a:pPr>
             <a:r>
-              <a:rPr lang="ru-RU" dirty="0" smtClean="0"/>
+              <a:rPr lang="ru-RU" dirty="0"/>
               <a:t>Образец текста</a:t>
             </a:r>
           </a:p>
@@ -8994,7 +8765,7 @@
               </a:spcBef>
             </a:pPr>
             <a:r>
-              <a:rPr lang="ru-RU" dirty="0" smtClean="0"/>
+              <a:rPr lang="ru-RU" dirty="0"/>
               <a:t>Второй уровень</a:t>
             </a:r>
           </a:p>
@@ -9005,7 +8776,7 @@
               </a:spcBef>
             </a:pPr>
             <a:r>
-              <a:rPr lang="ru-RU" dirty="0" smtClean="0"/>
+              <a:rPr lang="ru-RU" dirty="0"/>
               <a:t>Третий уровень</a:t>
             </a:r>
           </a:p>
@@ -9016,7 +8787,7 @@
               </a:spcBef>
             </a:pPr>
             <a:r>
-              <a:rPr lang="ru-RU" dirty="0" smtClean="0"/>
+              <a:rPr lang="ru-RU" dirty="0"/>
               <a:t>Четвертый уровень</a:t>
             </a:r>
           </a:p>
@@ -9049,20 +8820,13 @@
     </p:spTree>
     <p:extLst>
       <p:ext uri="{BB962C8B-B14F-4D97-AF65-F5344CB8AC3E}">
-        <p14:creationId xmlns="" xmlns:p14="http://schemas.microsoft.com/office/powerpoint/2010/main" val="1853485433"/>
+        <p14:creationId xmlns:p14="http://schemas.microsoft.com/office/powerpoint/2010/main" val="1853485433"/>
       </p:ext>
     </p:extLst>
   </p:cSld>
   <p:clrMapOvr>
     <a:masterClrMapping/>
   </p:clrMapOvr>
-  <p:timing>
-    <p:tnLst>
-      <p:par>
-        <p:cTn id="1" dur="indefinite" restart="never" nodeType="tmRoot"/>
-      </p:par>
-    </p:tnLst>
-  </p:timing>
 </p:sldLayout>
 </file>
 
@@ -9095,7 +8859,7 @@
           <a:blip r:embed="rId2" cstate="print">
             <a:extLst>
               <a:ext uri="{28A0092B-C50C-407E-A947-70E740481C1C}">
-                <a14:useLocalDpi xmlns="" xmlns:a14="http://schemas.microsoft.com/office/drawing/2010/main" val="0"/>
+                <a14:useLocalDpi xmlns:a14="http://schemas.microsoft.com/office/drawing/2010/main" val="0"/>
               </a:ext>
             </a:extLst>
           </a:blip>
@@ -9176,7 +8940,7 @@
             <a:fld id="{51968386-BB2C-47E0-AF1D-B94F15444D88}" type="datetime1">
               <a:rPr lang="pl-PL" smtClean="0"/>
               <a:pPr/>
-              <a:t>2020-01-27</a:t>
+              <a:t>27.01.2020</a:t>
             </a:fld>
             <a:endParaRPr lang="pl-PL"/>
           </a:p>
@@ -9238,7 +9002,7 @@
               </a:spcBef>
             </a:pPr>
             <a:r>
-              <a:rPr lang="ru-RU" dirty="0" smtClean="0"/>
+              <a:rPr lang="ru-RU" dirty="0"/>
               <a:t>Образец текста</a:t>
             </a:r>
           </a:p>
@@ -9249,7 +9013,7 @@
               </a:spcBef>
             </a:pPr>
             <a:r>
-              <a:rPr lang="ru-RU" dirty="0" smtClean="0"/>
+              <a:rPr lang="ru-RU" dirty="0"/>
               <a:t>Второй уровень</a:t>
             </a:r>
           </a:p>
@@ -9260,7 +9024,7 @@
               </a:spcBef>
             </a:pPr>
             <a:r>
-              <a:rPr lang="ru-RU" dirty="0" smtClean="0"/>
+              <a:rPr lang="ru-RU" dirty="0"/>
               <a:t>Третий уровень</a:t>
             </a:r>
           </a:p>
@@ -9271,7 +9035,7 @@
               </a:spcBef>
             </a:pPr>
             <a:r>
-              <a:rPr lang="ru-RU" dirty="0" smtClean="0"/>
+              <a:rPr lang="ru-RU" dirty="0"/>
               <a:t>Четвертый уровень</a:t>
             </a:r>
           </a:p>
@@ -9304,20 +9068,13 @@
     </p:spTree>
     <p:extLst>
       <p:ext uri="{BB962C8B-B14F-4D97-AF65-F5344CB8AC3E}">
-        <p14:creationId xmlns="" xmlns:p14="http://schemas.microsoft.com/office/powerpoint/2010/main" val="978355709"/>
+        <p14:creationId xmlns:p14="http://schemas.microsoft.com/office/powerpoint/2010/main" val="978355709"/>
       </p:ext>
     </p:extLst>
   </p:cSld>
   <p:clrMapOvr>
     <a:masterClrMapping/>
   </p:clrMapOvr>
-  <p:timing>
-    <p:tnLst>
-      <p:par>
-        <p:cTn id="1" dur="indefinite" restart="never" nodeType="tmRoot"/>
-      </p:par>
-    </p:tnLst>
-  </p:timing>
 </p:sldLayout>
 </file>
 
@@ -9365,7 +9122,7 @@
           </a:lstStyle>
           <a:p>
             <a:r>
-              <a:rPr lang="ru-RU" smtClean="0"/>
+              <a:rPr lang="ru-RU"/>
               <a:t>Образец заголовка</a:t>
             </a:r>
             <a:endParaRPr lang="en-US" dirty="0"/>
@@ -9487,7 +9244,7 @@
           <a:p>
             <a:pPr lvl="0"/>
             <a:r>
-              <a:rPr lang="ru-RU" smtClean="0"/>
+              <a:rPr lang="ru-RU"/>
               <a:t>Образец текста</a:t>
             </a:r>
           </a:p>
@@ -9544,20 +9301,13 @@
     </p:spTree>
     <p:extLst>
       <p:ext uri="{BB962C8B-B14F-4D97-AF65-F5344CB8AC3E}">
-        <p14:creationId xmlns="" xmlns:p14="http://schemas.microsoft.com/office/powerpoint/2010/main" val="945174436"/>
+        <p14:creationId xmlns:p14="http://schemas.microsoft.com/office/powerpoint/2010/main" val="945174436"/>
       </p:ext>
     </p:extLst>
   </p:cSld>
   <p:clrMapOvr>
     <a:masterClrMapping/>
   </p:clrMapOvr>
-  <p:timing>
-    <p:tnLst>
-      <p:par>
-        <p:cTn id="1" dur="indefinite" restart="never" nodeType="tmRoot"/>
-      </p:par>
-    </p:tnLst>
-  </p:timing>
 </p:sldLayout>
 </file>
 
@@ -9602,7 +9352,7 @@
           <a:lstStyle/>
           <a:p>
             <a:r>
-              <a:rPr lang="ru-RU" smtClean="0"/>
+              <a:rPr lang="ru-RU"/>
               <a:t>Образец заголовка</a:t>
             </a:r>
             <a:endParaRPr lang="en-US" dirty="0"/>
@@ -9639,35 +9389,35 @@
           <a:p>
             <a:pPr lvl="0"/>
             <a:r>
-              <a:rPr lang="ru-RU" smtClean="0"/>
+              <a:rPr lang="ru-RU"/>
               <a:t>Образец текста</a:t>
             </a:r>
           </a:p>
           <a:p>
             <a:pPr lvl="1"/>
             <a:r>
-              <a:rPr lang="ru-RU" smtClean="0"/>
+              <a:rPr lang="ru-RU"/>
               <a:t>Второй уровень</a:t>
             </a:r>
           </a:p>
           <a:p>
             <a:pPr lvl="2"/>
             <a:r>
-              <a:rPr lang="ru-RU" smtClean="0"/>
+              <a:rPr lang="ru-RU"/>
               <a:t>Третий уровень</a:t>
             </a:r>
           </a:p>
           <a:p>
             <a:pPr lvl="3"/>
             <a:r>
-              <a:rPr lang="ru-RU" smtClean="0"/>
+              <a:rPr lang="ru-RU"/>
               <a:t>Четвертый уровень</a:t>
             </a:r>
           </a:p>
           <a:p>
             <a:pPr lvl="4"/>
             <a:r>
-              <a:rPr lang="ru-RU" smtClean="0"/>
+              <a:rPr lang="ru-RU"/>
               <a:t>Пятый уровень</a:t>
             </a:r>
             <a:endParaRPr lang="en-US" dirty="0"/>
@@ -9696,7 +9446,6 @@
           <a:p>
             <a:fld id="{E0A2B525-4DC4-4D80-9B28-8E8A85A06424}" type="datetimeFigureOut">
               <a:rPr lang="ru-RU" smtClean="0"/>
-              <a:pPr/>
               <a:t>27.01.2020</a:t>
             </a:fld>
             <a:endParaRPr lang="ru-RU"/>
@@ -9732,7 +9481,7 @@
           <p:cNvPr id="10" name="image7.png">
             <a:extLst>
               <a:ext uri="{FF2B5EF4-FFF2-40B4-BE49-F238E27FC236}">
-                <a16:creationId xmlns="" xmlns:a16="http://schemas.microsoft.com/office/drawing/2014/main" id="{8F638F12-3CB3-453E-B9E9-400A619287F9}"/>
+                <a16:creationId xmlns:a16="http://schemas.microsoft.com/office/drawing/2014/main" id="{8F638F12-3CB3-453E-B9E9-400A619287F9}"/>
               </a:ext>
             </a:extLst>
           </p:cNvPr>
@@ -9742,9 +9491,7 @@
           <p:nvPr/>
         </p:nvPicPr>
         <p:blipFill>
-          <a:blip r:embed="rId2" cstate="print">
-            <a:extLst/>
-          </a:blip>
+          <a:blip r:embed="rId2" cstate="print"/>
           <a:stretch>
             <a:fillRect/>
           </a:stretch>
@@ -9779,7 +9526,6 @@
           <a:p>
             <a:fld id="{E01011B8-8901-494C-ACF4-EF2A2E89E10E}" type="slidenum">
               <a:rPr lang="ru-RU" smtClean="0"/>
-              <a:pPr/>
               <a:t>‹#›</a:t>
             </a:fld>
             <a:endParaRPr lang="ru-RU"/>
@@ -9813,20 +9559,13 @@
     </p:spTree>
     <p:extLst>
       <p:ext uri="{BB962C8B-B14F-4D97-AF65-F5344CB8AC3E}">
-        <p14:creationId xmlns="" xmlns:p14="http://schemas.microsoft.com/office/powerpoint/2010/main" val="191039158"/>
+        <p14:creationId xmlns:p14="http://schemas.microsoft.com/office/powerpoint/2010/main" val="191039158"/>
       </p:ext>
     </p:extLst>
   </p:cSld>
   <p:clrMapOvr>
     <a:masterClrMapping/>
   </p:clrMapOvr>
-  <p:timing>
-    <p:tnLst>
-      <p:par>
-        <p:cTn id="1" dur="indefinite" restart="never" nodeType="tmRoot"/>
-      </p:par>
-    </p:tnLst>
-  </p:timing>
 </p:sldLayout>
 </file>
 
@@ -9863,7 +9602,7 @@
           <a:lstStyle/>
           <a:p>
             <a:r>
-              <a:rPr lang="ru-RU" smtClean="0"/>
+              <a:rPr lang="ru-RU"/>
               <a:t>Образец заголовка</a:t>
             </a:r>
             <a:endParaRPr lang="en-US" dirty="0"/>
@@ -9892,35 +9631,35 @@
           <a:p>
             <a:pPr lvl="0"/>
             <a:r>
-              <a:rPr lang="ru-RU" smtClean="0"/>
+              <a:rPr lang="ru-RU"/>
               <a:t>Образец текста</a:t>
             </a:r>
           </a:p>
           <a:p>
             <a:pPr lvl="1"/>
             <a:r>
-              <a:rPr lang="ru-RU" smtClean="0"/>
+              <a:rPr lang="ru-RU"/>
               <a:t>Второй уровень</a:t>
             </a:r>
           </a:p>
           <a:p>
             <a:pPr lvl="2"/>
             <a:r>
-              <a:rPr lang="ru-RU" smtClean="0"/>
+              <a:rPr lang="ru-RU"/>
               <a:t>Третий уровень</a:t>
             </a:r>
           </a:p>
           <a:p>
             <a:pPr lvl="3"/>
             <a:r>
-              <a:rPr lang="ru-RU" smtClean="0"/>
+              <a:rPr lang="ru-RU"/>
               <a:t>Четвертый уровень</a:t>
             </a:r>
           </a:p>
           <a:p>
             <a:pPr lvl="4"/>
             <a:r>
-              <a:rPr lang="ru-RU" smtClean="0"/>
+              <a:rPr lang="ru-RU"/>
               <a:t>Пятый уровень</a:t>
             </a:r>
             <a:endParaRPr lang="en-US" dirty="0"/>
@@ -9949,35 +9688,35 @@
           <a:p>
             <a:pPr lvl="0"/>
             <a:r>
-              <a:rPr lang="ru-RU" smtClean="0"/>
+              <a:rPr lang="ru-RU"/>
               <a:t>Образец текста</a:t>
             </a:r>
           </a:p>
           <a:p>
             <a:pPr lvl="1"/>
             <a:r>
-              <a:rPr lang="ru-RU" smtClean="0"/>
+              <a:rPr lang="ru-RU"/>
               <a:t>Второй уровень</a:t>
             </a:r>
           </a:p>
           <a:p>
             <a:pPr lvl="2"/>
             <a:r>
-              <a:rPr lang="ru-RU" smtClean="0"/>
+              <a:rPr lang="ru-RU"/>
               <a:t>Третий уровень</a:t>
             </a:r>
           </a:p>
           <a:p>
             <a:pPr lvl="3"/>
             <a:r>
-              <a:rPr lang="ru-RU" smtClean="0"/>
+              <a:rPr lang="ru-RU"/>
               <a:t>Четвертый уровень</a:t>
             </a:r>
           </a:p>
           <a:p>
             <a:pPr lvl="4"/>
             <a:r>
-              <a:rPr lang="ru-RU" smtClean="0"/>
+              <a:rPr lang="ru-RU"/>
               <a:t>Пятый уровень</a:t>
             </a:r>
             <a:endParaRPr lang="en-US" dirty="0"/>
@@ -10001,7 +9740,6 @@
           <a:p>
             <a:fld id="{E0A2B525-4DC4-4D80-9B28-8E8A85A06424}" type="datetimeFigureOut">
               <a:rPr lang="ru-RU" smtClean="0"/>
-              <a:pPr/>
               <a:t>27.01.2020</a:t>
             </a:fld>
             <a:endParaRPr lang="ru-RU"/>
@@ -10044,7 +9782,6 @@
           <a:p>
             <a:fld id="{E01011B8-8901-494C-ACF4-EF2A2E89E10E}" type="slidenum">
               <a:rPr lang="ru-RU" smtClean="0"/>
-              <a:pPr/>
               <a:t>‹#›</a:t>
             </a:fld>
             <a:endParaRPr lang="ru-RU"/>
@@ -10078,20 +9815,13 @@
     </p:spTree>
     <p:extLst>
       <p:ext uri="{BB962C8B-B14F-4D97-AF65-F5344CB8AC3E}">
-        <p14:creationId xmlns="" xmlns:p14="http://schemas.microsoft.com/office/powerpoint/2010/main" val="1114069287"/>
+        <p14:creationId xmlns:p14="http://schemas.microsoft.com/office/powerpoint/2010/main" val="1114069287"/>
       </p:ext>
     </p:extLst>
   </p:cSld>
   <p:clrMapOvr>
     <a:masterClrMapping/>
   </p:clrMapOvr>
-  <p:timing>
-    <p:tnLst>
-      <p:par>
-        <p:cTn id="1" dur="indefinite" restart="never" nodeType="tmRoot"/>
-      </p:par>
-    </p:tnLst>
-  </p:timing>
 </p:sldLayout>
 </file>
 
@@ -10133,7 +9863,7 @@
           <a:lstStyle/>
           <a:p>
             <a:r>
-              <a:rPr lang="ru-RU" smtClean="0"/>
+              <a:rPr lang="ru-RU"/>
               <a:t>Образец заголовка</a:t>
             </a:r>
             <a:endParaRPr lang="en-US" dirty="0"/>
@@ -10199,7 +9929,7 @@
           <a:p>
             <a:pPr lvl="0"/>
             <a:r>
-              <a:rPr lang="ru-RU" smtClean="0"/>
+              <a:rPr lang="ru-RU"/>
               <a:t>Образец текста</a:t>
             </a:r>
           </a:p>
@@ -10227,35 +9957,35 @@
           <a:p>
             <a:pPr lvl="0"/>
             <a:r>
-              <a:rPr lang="ru-RU" smtClean="0"/>
+              <a:rPr lang="ru-RU"/>
               <a:t>Образец текста</a:t>
             </a:r>
           </a:p>
           <a:p>
             <a:pPr lvl="1"/>
             <a:r>
-              <a:rPr lang="ru-RU" smtClean="0"/>
+              <a:rPr lang="ru-RU"/>
               <a:t>Второй уровень</a:t>
             </a:r>
           </a:p>
           <a:p>
             <a:pPr lvl="2"/>
             <a:r>
-              <a:rPr lang="ru-RU" smtClean="0"/>
+              <a:rPr lang="ru-RU"/>
               <a:t>Третий уровень</a:t>
             </a:r>
           </a:p>
           <a:p>
             <a:pPr lvl="3"/>
             <a:r>
-              <a:rPr lang="ru-RU" smtClean="0"/>
+              <a:rPr lang="ru-RU"/>
               <a:t>Четвертый уровень</a:t>
             </a:r>
           </a:p>
           <a:p>
             <a:pPr lvl="4"/>
             <a:r>
-              <a:rPr lang="ru-RU" smtClean="0"/>
+              <a:rPr lang="ru-RU"/>
               <a:t>Пятый уровень</a:t>
             </a:r>
             <a:endParaRPr lang="en-US" dirty="0"/>
@@ -10321,7 +10051,7 @@
           <a:p>
             <a:pPr lvl="0"/>
             <a:r>
-              <a:rPr lang="ru-RU" smtClean="0"/>
+              <a:rPr lang="ru-RU"/>
               <a:t>Образец текста</a:t>
             </a:r>
           </a:p>
@@ -10349,35 +10079,35 @@
           <a:p>
             <a:pPr lvl="0"/>
             <a:r>
-              <a:rPr lang="ru-RU" smtClean="0"/>
+              <a:rPr lang="ru-RU"/>
               <a:t>Образец текста</a:t>
             </a:r>
           </a:p>
           <a:p>
             <a:pPr lvl="1"/>
             <a:r>
-              <a:rPr lang="ru-RU" smtClean="0"/>
+              <a:rPr lang="ru-RU"/>
               <a:t>Второй уровень</a:t>
             </a:r>
           </a:p>
           <a:p>
             <a:pPr lvl="2"/>
             <a:r>
-              <a:rPr lang="ru-RU" smtClean="0"/>
+              <a:rPr lang="ru-RU"/>
               <a:t>Третий уровень</a:t>
             </a:r>
           </a:p>
           <a:p>
             <a:pPr lvl="3"/>
             <a:r>
-              <a:rPr lang="ru-RU" smtClean="0"/>
+              <a:rPr lang="ru-RU"/>
               <a:t>Четвертый уровень</a:t>
             </a:r>
           </a:p>
           <a:p>
             <a:pPr lvl="4"/>
             <a:r>
-              <a:rPr lang="ru-RU" smtClean="0"/>
+              <a:rPr lang="ru-RU"/>
               <a:t>Пятый уровень</a:t>
             </a:r>
             <a:endParaRPr lang="en-US" dirty="0"/>
@@ -10401,7 +10131,6 @@
           <a:p>
             <a:fld id="{E0A2B525-4DC4-4D80-9B28-8E8A85A06424}" type="datetimeFigureOut">
               <a:rPr lang="ru-RU" smtClean="0"/>
-              <a:pPr/>
               <a:t>27.01.2020</a:t>
             </a:fld>
             <a:endParaRPr lang="ru-RU"/>
@@ -10444,7 +10173,6 @@
           <a:p>
             <a:fld id="{E01011B8-8901-494C-ACF4-EF2A2E89E10E}" type="slidenum">
               <a:rPr lang="ru-RU" smtClean="0"/>
-              <a:pPr/>
               <a:t>‹#›</a:t>
             </a:fld>
             <a:endParaRPr lang="ru-RU"/>
@@ -10478,20 +10206,13 @@
     </p:spTree>
     <p:extLst>
       <p:ext uri="{BB962C8B-B14F-4D97-AF65-F5344CB8AC3E}">
-        <p14:creationId xmlns="" xmlns:p14="http://schemas.microsoft.com/office/powerpoint/2010/main" val="782806702"/>
+        <p14:creationId xmlns:p14="http://schemas.microsoft.com/office/powerpoint/2010/main" val="782806702"/>
       </p:ext>
     </p:extLst>
   </p:cSld>
   <p:clrMapOvr>
     <a:masterClrMapping/>
   </p:clrMapOvr>
-  <p:timing>
-    <p:tnLst>
-      <p:par>
-        <p:cTn id="1" dur="indefinite" restart="never" nodeType="tmRoot"/>
-      </p:par>
-    </p:tnLst>
-  </p:timing>
 </p:sldLayout>
 </file>
 
@@ -10528,7 +10249,7 @@
           <a:lstStyle/>
           <a:p>
             <a:r>
-              <a:rPr lang="ru-RU" smtClean="0"/>
+              <a:rPr lang="ru-RU"/>
               <a:t>Образец заголовка</a:t>
             </a:r>
             <a:endParaRPr lang="en-US" dirty="0"/>
@@ -10552,7 +10273,6 @@
           <a:p>
             <a:fld id="{E0A2B525-4DC4-4D80-9B28-8E8A85A06424}" type="datetimeFigureOut">
               <a:rPr lang="ru-RU" smtClean="0"/>
-              <a:pPr/>
               <a:t>27.01.2020</a:t>
             </a:fld>
             <a:endParaRPr lang="ru-RU"/>
@@ -10595,7 +10315,6 @@
           <a:p>
             <a:fld id="{E01011B8-8901-494C-ACF4-EF2A2E89E10E}" type="slidenum">
               <a:rPr lang="ru-RU" smtClean="0"/>
-              <a:pPr/>
               <a:t>‹#›</a:t>
             </a:fld>
             <a:endParaRPr lang="ru-RU"/>
@@ -10607,7 +10326,7 @@
           <p:cNvPr id="8" name="Table 93">
             <a:extLst>
               <a:ext uri="{FF2B5EF4-FFF2-40B4-BE49-F238E27FC236}">
-                <a16:creationId xmlns="" xmlns:a16="http://schemas.microsoft.com/office/drawing/2014/main" id="{63861C41-A286-4CBE-9EBF-DBE851D12C0E}"/>
+                <a16:creationId xmlns:a16="http://schemas.microsoft.com/office/drawing/2014/main" id="{63861C41-A286-4CBE-9EBF-DBE851D12C0E}"/>
               </a:ext>
             </a:extLst>
           </p:cNvPr>
@@ -10615,7 +10334,7 @@
           <p:nvPr>
             <p:extLst>
               <p:ext uri="{D42A27DB-BD31-4B8C-83A1-F6EECF244321}">
-                <p14:modId xmlns="" xmlns:p14="http://schemas.microsoft.com/office/powerpoint/2010/main" val="2213085898"/>
+                <p14:modId xmlns:p14="http://schemas.microsoft.com/office/powerpoint/2010/main" val="2213085898"/>
               </p:ext>
             </p:extLst>
           </p:nvPr>
@@ -10632,28 +10351,28 @@
                 <a:gridCol w="1284685">
                   <a:extLst>
                     <a:ext uri="{9D8B030D-6E8A-4147-A177-3AD203B41FA5}">
-                      <a16:colId xmlns="" xmlns:a16="http://schemas.microsoft.com/office/drawing/2014/main" val="20000"/>
+                      <a16:colId xmlns:a16="http://schemas.microsoft.com/office/drawing/2014/main" val="20000"/>
                     </a:ext>
                   </a:extLst>
                 </a:gridCol>
                 <a:gridCol w="1284685">
                   <a:extLst>
                     <a:ext uri="{9D8B030D-6E8A-4147-A177-3AD203B41FA5}">
-                      <a16:colId xmlns="" xmlns:a16="http://schemas.microsoft.com/office/drawing/2014/main" val="20001"/>
+                      <a16:colId xmlns:a16="http://schemas.microsoft.com/office/drawing/2014/main" val="20001"/>
                     </a:ext>
                   </a:extLst>
                 </a:gridCol>
                 <a:gridCol w="1284685">
                   <a:extLst>
                     <a:ext uri="{9D8B030D-6E8A-4147-A177-3AD203B41FA5}">
-                      <a16:colId xmlns="" xmlns:a16="http://schemas.microsoft.com/office/drawing/2014/main" val="20002"/>
+                      <a16:colId xmlns:a16="http://schemas.microsoft.com/office/drawing/2014/main" val="20002"/>
                     </a:ext>
                   </a:extLst>
                 </a:gridCol>
                 <a:gridCol w="1284685">
                   <a:extLst>
                     <a:ext uri="{9D8B030D-6E8A-4147-A177-3AD203B41FA5}">
-                      <a16:colId xmlns="" xmlns:a16="http://schemas.microsoft.com/office/drawing/2014/main" val="20003"/>
+                      <a16:colId xmlns:a16="http://schemas.microsoft.com/office/drawing/2014/main" val="20003"/>
                     </a:ext>
                   </a:extLst>
                 </a:gridCol>
@@ -10949,7 +10668,7 @@
                 </a:tc>
                 <a:extLst>
                   <a:ext uri="{0D108BD9-81ED-4DB2-BD59-A6C34878D82A}">
-                    <a16:rowId xmlns="" xmlns:a16="http://schemas.microsoft.com/office/drawing/2014/main" val="10000"/>
+                    <a16:rowId xmlns:a16="http://schemas.microsoft.com/office/drawing/2014/main" val="10000"/>
                   </a:ext>
                 </a:extLst>
               </a:tr>
@@ -11216,7 +10935,7 @@
                 </a:tc>
                 <a:extLst>
                   <a:ext uri="{0D108BD9-81ED-4DB2-BD59-A6C34878D82A}">
-                    <a16:rowId xmlns="" xmlns:a16="http://schemas.microsoft.com/office/drawing/2014/main" val="10001"/>
+                    <a16:rowId xmlns:a16="http://schemas.microsoft.com/office/drawing/2014/main" val="10001"/>
                   </a:ext>
                 </a:extLst>
               </a:tr>
@@ -11483,7 +11202,7 @@
                 </a:tc>
                 <a:extLst>
                   <a:ext uri="{0D108BD9-81ED-4DB2-BD59-A6C34878D82A}">
-                    <a16:rowId xmlns="" xmlns:a16="http://schemas.microsoft.com/office/drawing/2014/main" val="10002"/>
+                    <a16:rowId xmlns:a16="http://schemas.microsoft.com/office/drawing/2014/main" val="10002"/>
                   </a:ext>
                 </a:extLst>
               </a:tr>
@@ -11750,7 +11469,7 @@
                 </a:tc>
                 <a:extLst>
                   <a:ext uri="{0D108BD9-81ED-4DB2-BD59-A6C34878D82A}">
-                    <a16:rowId xmlns="" xmlns:a16="http://schemas.microsoft.com/office/drawing/2014/main" val="10003"/>
+                    <a16:rowId xmlns:a16="http://schemas.microsoft.com/office/drawing/2014/main" val="10003"/>
                   </a:ext>
                 </a:extLst>
               </a:tr>
@@ -12017,7 +11736,7 @@
                 </a:tc>
                 <a:extLst>
                   <a:ext uri="{0D108BD9-81ED-4DB2-BD59-A6C34878D82A}">
-                    <a16:rowId xmlns="" xmlns:a16="http://schemas.microsoft.com/office/drawing/2014/main" val="10004"/>
+                    <a16:rowId xmlns:a16="http://schemas.microsoft.com/office/drawing/2014/main" val="10004"/>
                   </a:ext>
                 </a:extLst>
               </a:tr>
@@ -12052,20 +11771,13 @@
     </p:spTree>
     <p:extLst>
       <p:ext uri="{BB962C8B-B14F-4D97-AF65-F5344CB8AC3E}">
-        <p14:creationId xmlns="" xmlns:p14="http://schemas.microsoft.com/office/powerpoint/2010/main" val="2137495512"/>
+        <p14:creationId xmlns:p14="http://schemas.microsoft.com/office/powerpoint/2010/main" val="2137495512"/>
       </p:ext>
     </p:extLst>
   </p:cSld>
   <p:clrMapOvr>
     <a:masterClrMapping/>
   </p:clrMapOvr>
-  <p:timing>
-    <p:tnLst>
-      <p:par>
-        <p:cTn id="1" dur="indefinite" restart="never" nodeType="tmRoot"/>
-      </p:par>
-    </p:tnLst>
-  </p:timing>
 </p:sldLayout>
 </file>
 
@@ -12102,7 +11814,7 @@
           <a:lstStyle/>
           <a:p>
             <a:r>
-              <a:rPr lang="ru-RU" smtClean="0"/>
+              <a:rPr lang="ru-RU"/>
               <a:t>Образец заголовка</a:t>
             </a:r>
             <a:endParaRPr lang="en-US" dirty="0"/>
@@ -12126,7 +11838,6 @@
           <a:p>
             <a:fld id="{E0A2B525-4DC4-4D80-9B28-8E8A85A06424}" type="datetimeFigureOut">
               <a:rPr lang="ru-RU" smtClean="0"/>
-              <a:pPr/>
               <a:t>27.01.2020</a:t>
             </a:fld>
             <a:endParaRPr lang="ru-RU"/>
@@ -12169,7 +11880,6 @@
           <a:p>
             <a:fld id="{E01011B8-8901-494C-ACF4-EF2A2E89E10E}" type="slidenum">
               <a:rPr lang="ru-RU" smtClean="0"/>
-              <a:pPr/>
               <a:t>‹#›</a:t>
             </a:fld>
             <a:endParaRPr lang="ru-RU"/>
@@ -12203,20 +11913,13 @@
     </p:spTree>
     <p:extLst>
       <p:ext uri="{BB962C8B-B14F-4D97-AF65-F5344CB8AC3E}">
-        <p14:creationId xmlns="" xmlns:p14="http://schemas.microsoft.com/office/powerpoint/2010/main" val="2193504907"/>
+        <p14:creationId xmlns:p14="http://schemas.microsoft.com/office/powerpoint/2010/main" val="2193504907"/>
       </p:ext>
     </p:extLst>
   </p:cSld>
   <p:clrMapOvr>
     <a:masterClrMapping/>
   </p:clrMapOvr>
-  <p:timing>
-    <p:tnLst>
-      <p:par>
-        <p:cTn id="1" dur="indefinite" restart="never" nodeType="tmRoot"/>
-      </p:par>
-    </p:tnLst>
-  </p:timing>
 </p:sldLayout>
 </file>
 
@@ -12356,7 +12059,6 @@
           <a:p>
             <a:fld id="{E0A2B525-4DC4-4D80-9B28-8E8A85A06424}" type="datetimeFigureOut">
               <a:rPr lang="ru-RU" smtClean="0"/>
-              <a:pPr/>
               <a:t>27.01.2020</a:t>
             </a:fld>
             <a:endParaRPr lang="ru-RU"/>
@@ -12399,7 +12101,6 @@
           <a:p>
             <a:fld id="{E01011B8-8901-494C-ACF4-EF2A2E89E10E}" type="slidenum">
               <a:rPr lang="ru-RU" smtClean="0"/>
-              <a:pPr/>
               <a:t>‹#›</a:t>
             </a:fld>
             <a:endParaRPr lang="ru-RU"/>
@@ -12445,7 +12146,7 @@
     </p:spTree>
     <p:extLst>
       <p:ext uri="{BB962C8B-B14F-4D97-AF65-F5344CB8AC3E}">
-        <p14:creationId xmlns="" xmlns:p14="http://schemas.microsoft.com/office/powerpoint/2010/main" val="3685614989"/>
+        <p14:creationId xmlns:p14="http://schemas.microsoft.com/office/powerpoint/2010/main" val="3685614989"/>
       </p:ext>
     </p:extLst>
   </p:cSld>
@@ -12471,13 +12172,6 @@
     <p:sldLayoutId id="2147483678" r:id="rId18"/>
     <p:sldLayoutId id="2147483679" r:id="rId19"/>
   </p:sldLayoutIdLst>
-  <p:timing>
-    <p:tnLst>
-      <p:par>
-        <p:cTn id="1" dur="indefinite" restart="never" nodeType="tmRoot"/>
-      </p:par>
-    </p:tnLst>
-  </p:timing>
   <p:txStyles>
     <p:titleStyle>
       <a:lvl1pPr algn="l" defTabSz="914309" rtl="0" eaLnBrk="1" latinLnBrk="0" hangingPunct="1">
@@ -12898,7 +12592,7 @@
             <a:fld id="{9187ACAA-BA05-403C-B094-06E99B1B296A}" type="datetime1">
               <a:rPr lang="pl-PL" smtClean="0"/>
               <a:pPr/>
-              <a:t>2020-01-27</a:t>
+              <a:t>27.01.2020</a:t>
             </a:fld>
             <a:endParaRPr lang="pl-PL"/>
           </a:p>
@@ -12986,7 +12680,7 @@
     </p:spTree>
     <p:extLst>
       <p:ext uri="{BB962C8B-B14F-4D97-AF65-F5344CB8AC3E}">
-        <p14:creationId xmlns="" xmlns:p14="http://schemas.microsoft.com/office/powerpoint/2010/main" val="3931751818"/>
+        <p14:creationId xmlns:p14="http://schemas.microsoft.com/office/powerpoint/2010/main" val="3931751818"/>
       </p:ext>
     </p:extLst>
   </p:cSld>
@@ -13012,13 +12706,6 @@
     <p:sldLayoutId id="2147483698" r:id="rId18"/>
     <p:sldLayoutId id="2147483699" r:id="rId19"/>
   </p:sldLayoutIdLst>
-  <p:timing>
-    <p:tnLst>
-      <p:par>
-        <p:cTn id="1" dur="indefinite" restart="never" nodeType="tmRoot"/>
-      </p:par>
-    </p:tnLst>
-  </p:timing>
   <p:hf sldNum="0" hdr="0" ftr="0" dt="0"/>
   <p:txStyles>
     <p:titleStyle>
@@ -13336,12 +13023,8 @@
           <a:lstStyle/>
           <a:p>
             <a:r>
-              <a:rPr lang="pl-PL" dirty="0" smtClean="0"/>
-              <a:t>Rozpoznawanie dźwięku za pomocą </a:t>
-            </a:r>
-            <a:r>
-              <a:rPr lang="pl-PL" dirty="0" smtClean="0"/>
-              <a:t>MLP</a:t>
+              <a:rPr lang="pl-PL" dirty="0"/>
+              <a:t>Rozpoznawanie dźwięku za pomocą MLP</a:t>
             </a:r>
             <a:endParaRPr lang="ru-RU" dirty="0"/>
           </a:p>
@@ -13363,28 +13046,14 @@
           <a:lstStyle/>
           <a:p>
             <a:r>
-              <a:rPr lang="pl-PL" dirty="0" smtClean="0"/>
-              <a:t>inż. Tomasz Bałdyga,</a:t>
-            </a:r>
-          </a:p>
-          <a:p>
-            <a:r>
-              <a:rPr lang="pl-PL" dirty="0" smtClean="0"/>
-              <a:t>inż. Oleksii </a:t>
-            </a:r>
-            <a:r>
-              <a:rPr lang="pl-PL" dirty="0" smtClean="0"/>
-              <a:t>Kosobutskyi</a:t>
-            </a:r>
-          </a:p>
-          <a:p>
-            <a:r>
-              <a:rPr lang="pl-PL" dirty="0" smtClean="0"/>
-              <a:t>31</a:t>
-            </a:r>
-            <a:r>
-              <a:rPr lang="pl-PL" dirty="0" smtClean="0"/>
-              <a:t>.01.2020</a:t>
+              <a:rPr lang="pl-PL" dirty="0"/>
+              <a:t>Oleksii Kosobutskyi</a:t>
+            </a:r>
+          </a:p>
+          <a:p>
+            <a:r>
+              <a:rPr lang="pl-PL" dirty="0"/>
+              <a:t>27.01.2020</a:t>
             </a:r>
             <a:endParaRPr lang="ru-RU" dirty="0"/>
           </a:p>
@@ -13748,7 +13417,7 @@
   <a:extraClrSchemeLst/>
   <a:extLst>
     <a:ext uri="{05A4C25C-085E-4340-85A3-A5531E510DB2}">
-      <thm15:themeFamily xmlns="" xmlns:thm15="http://schemas.microsoft.com/office/thememl/2012/main" name="Prezentacja2" id="{AF77654C-7985-4C0A-AE90-D1732C9A6E9E}" vid="{ACED2FCA-EB2A-46EB-A8D5-7E5CA93A5F09}"/>
+      <thm15:themeFamily xmlns:thm15="http://schemas.microsoft.com/office/thememl/2012/main" name="Prezentacja2" id="{AF77654C-7985-4C0A-AE90-D1732C9A6E9E}" vid="{ACED2FCA-EB2A-46EB-A8D5-7E5CA93A5F09}"/>
     </a:ext>
   </a:extLst>
 </a:theme>
@@ -14009,7 +13678,7 @@
   <a:extraClrSchemeLst/>
   <a:extLst>
     <a:ext uri="{05A4C25C-085E-4340-85A3-A5531E510DB2}">
-      <thm15:themeFamily xmlns="" xmlns:thm15="http://schemas.microsoft.com/office/thememl/2012/main" name="Prezentacja2" id="{AF77654C-7985-4C0A-AE90-D1732C9A6E9E}" vid="{F610396C-B832-45C1-8145-0A8B0EF479C2}"/>
+      <thm15:themeFamily xmlns:thm15="http://schemas.microsoft.com/office/thememl/2012/main" name="Prezentacja2" id="{AF77654C-7985-4C0A-AE90-D1732C9A6E9E}" vid="{F610396C-B832-45C1-8145-0A8B0EF479C2}"/>
     </a:ext>
   </a:extLst>
 </a:theme>

</xml_diff>